<commit_message>
Updated slides and annimations
</commit_message>
<xml_diff>
--- a/slides/6_InformationRetrivalSearch.pptx
+++ b/slides/6_InformationRetrivalSearch.pptx
@@ -10,9 +10,9 @@
   <p:sldIdLst>
     <p:sldId id="275" r:id="rId2"/>
     <p:sldId id="327" r:id="rId3"/>
-    <p:sldId id="279" r:id="rId4"/>
-    <p:sldId id="356" r:id="rId5"/>
-    <p:sldId id="314" r:id="rId6"/>
+    <p:sldId id="314" r:id="rId4"/>
+    <p:sldId id="279" r:id="rId5"/>
+    <p:sldId id="356" r:id="rId6"/>
     <p:sldId id="331" r:id="rId7"/>
     <p:sldId id="361" r:id="rId8"/>
     <p:sldId id="268" r:id="rId9"/>
@@ -251,7 +251,7 @@
           <a:p>
             <a:fld id="{AD10E277-7B52-48CF-8A81-813C08FCADB8}" type="datetimeFigureOut">
               <a:rPr lang="en-US" smtClean="0"/>
-              <a:t>9/23/2025</a:t>
+              <a:t>10/18/2025</a:t>
             </a:fld>
             <a:endParaRPr lang="en-US"/>
           </a:p>
@@ -992,7 +992,7 @@
           <a:p>
             <a:fld id="{A0BE7E77-FE47-445E-A4A9-C9AC534D337D}" type="datetimeFigureOut">
               <a:rPr lang="en-US" smtClean="0"/>
-              <a:t>9/23/2025</a:t>
+              <a:t>10/18/2025</a:t>
             </a:fld>
             <a:endParaRPr lang="en-US"/>
           </a:p>
@@ -1190,7 +1190,7 @@
           <a:p>
             <a:fld id="{A0BE7E77-FE47-445E-A4A9-C9AC534D337D}" type="datetimeFigureOut">
               <a:rPr lang="en-US" smtClean="0"/>
-              <a:t>9/23/2025</a:t>
+              <a:t>10/18/2025</a:t>
             </a:fld>
             <a:endParaRPr lang="en-US"/>
           </a:p>
@@ -1398,7 +1398,7 @@
           <a:p>
             <a:fld id="{A0BE7E77-FE47-445E-A4A9-C9AC534D337D}" type="datetimeFigureOut">
               <a:rPr lang="en-US" smtClean="0"/>
-              <a:t>9/23/2025</a:t>
+              <a:t>10/18/2025</a:t>
             </a:fld>
             <a:endParaRPr lang="en-US"/>
           </a:p>
@@ -1768,7 +1768,7 @@
           <a:p>
             <a:fld id="{A0BE7E77-FE47-445E-A4A9-C9AC534D337D}" type="datetimeFigureOut">
               <a:rPr lang="en-US" smtClean="0"/>
-              <a:t>9/23/2025</a:t>
+              <a:t>10/18/2025</a:t>
             </a:fld>
             <a:endParaRPr lang="en-US"/>
           </a:p>
@@ -2043,7 +2043,7 @@
           <a:p>
             <a:fld id="{A0BE7E77-FE47-445E-A4A9-C9AC534D337D}" type="datetimeFigureOut">
               <a:rPr lang="en-US" smtClean="0"/>
-              <a:t>9/23/2025</a:t>
+              <a:t>10/18/2025</a:t>
             </a:fld>
             <a:endParaRPr lang="en-US"/>
           </a:p>
@@ -2308,7 +2308,7 @@
           <a:p>
             <a:fld id="{A0BE7E77-FE47-445E-A4A9-C9AC534D337D}" type="datetimeFigureOut">
               <a:rPr lang="en-US" smtClean="0"/>
-              <a:t>9/23/2025</a:t>
+              <a:t>10/18/2025</a:t>
             </a:fld>
             <a:endParaRPr lang="en-US"/>
           </a:p>
@@ -2720,7 +2720,7 @@
           <a:p>
             <a:fld id="{A0BE7E77-FE47-445E-A4A9-C9AC534D337D}" type="datetimeFigureOut">
               <a:rPr lang="en-US" smtClean="0"/>
-              <a:t>9/23/2025</a:t>
+              <a:t>10/18/2025</a:t>
             </a:fld>
             <a:endParaRPr lang="en-US"/>
           </a:p>
@@ -2861,7 +2861,7 @@
           <a:p>
             <a:fld id="{A0BE7E77-FE47-445E-A4A9-C9AC534D337D}" type="datetimeFigureOut">
               <a:rPr lang="en-US" smtClean="0"/>
-              <a:t>9/23/2025</a:t>
+              <a:t>10/18/2025</a:t>
             </a:fld>
             <a:endParaRPr lang="en-US"/>
           </a:p>
@@ -2974,7 +2974,7 @@
           <a:p>
             <a:fld id="{A0BE7E77-FE47-445E-A4A9-C9AC534D337D}" type="datetimeFigureOut">
               <a:rPr lang="en-US" smtClean="0"/>
-              <a:t>9/23/2025</a:t>
+              <a:t>10/18/2025</a:t>
             </a:fld>
             <a:endParaRPr lang="en-US"/>
           </a:p>
@@ -3285,7 +3285,7 @@
           <a:p>
             <a:fld id="{A0BE7E77-FE47-445E-A4A9-C9AC534D337D}" type="datetimeFigureOut">
               <a:rPr lang="en-US" smtClean="0"/>
-              <a:t>9/23/2025</a:t>
+              <a:t>10/18/2025</a:t>
             </a:fld>
             <a:endParaRPr lang="en-US"/>
           </a:p>
@@ -3573,7 +3573,7 @@
           <a:p>
             <a:fld id="{A0BE7E77-FE47-445E-A4A9-C9AC534D337D}" type="datetimeFigureOut">
               <a:rPr lang="en-US" smtClean="0"/>
-              <a:t>9/23/2025</a:t>
+              <a:t>10/18/2025</a:t>
             </a:fld>
             <a:endParaRPr lang="en-US"/>
           </a:p>
@@ -3814,7 +3814,7 @@
           <a:p>
             <a:fld id="{A0BE7E77-FE47-445E-A4A9-C9AC534D337D}" type="datetimeFigureOut">
               <a:rPr lang="en-US" smtClean="0"/>
-              <a:t>9/23/2025</a:t>
+              <a:t>10/18/2025</a:t>
             </a:fld>
             <a:endParaRPr lang="en-US"/>
           </a:p>
@@ -4612,8 +4612,8 @@
           <a:chExt cx="0" cy="0"/>
         </a:xfrm>
       </p:grpSpPr>
-      <mc:AlternateContent xmlns:mc="http://schemas.openxmlformats.org/markup-compatibility/2006" xmlns:a14="http://schemas.microsoft.com/office/drawing/2010/main">
-        <mc:Choice Requires="a14">
+      <mc:AlternateContent xmlns:mc="http://schemas.openxmlformats.org/markup-compatibility/2006">
+        <mc:Choice xmlns:a14="http://schemas.microsoft.com/office/drawing/2010/main" Requires="a14">
           <p:sp>
             <p:nvSpPr>
               <p:cNvPr id="3" name="Content Placeholder 2">
@@ -4731,7 +4731,7 @@
                 <a:pPr lvl="1"/>
                 <a:r>
                   <a:rPr lang="en-US" dirty="0"/>
-                  <a:t>Generally, store as hash table or use dimensionality reduction for efficiency   </a:t>
+                  <a:t>Generally, store as hash table (dictionary) or use dimensionality reduction for efficiency   </a:t>
                 </a:r>
               </a:p>
               <a:p>
@@ -4746,7 +4746,7 @@
             </p:txBody>
           </p:sp>
         </mc:Choice>
-        <mc:Fallback xmlns="">
+        <mc:Fallback>
           <p:sp>
             <p:nvSpPr>
               <p:cNvPr id="3" name="Content Placeholder 2">
@@ -4771,7 +4771,7 @@
               <a:blipFill>
                 <a:blip r:embed="rId2"/>
                 <a:stretch>
-                  <a:fillRect l="-1217" t="-1925"/>
+                  <a:fillRect l="-1217" t="-1925" r="-348"/>
                 </a:stretch>
               </a:blipFill>
             </p:spPr>
@@ -8843,6 +8843,400 @@
   <p:clrMapOvr>
     <a:masterClrMapping/>
   </p:clrMapOvr>
+  <p:timing>
+    <p:tnLst>
+      <p:par>
+        <p:cTn id="1" dur="indefinite" restart="never" nodeType="tmRoot">
+          <p:childTnLst>
+            <p:seq concurrent="1" nextAc="seek">
+              <p:cTn id="2" dur="indefinite" nodeType="mainSeq">
+                <p:childTnLst>
+                  <p:par>
+                    <p:cTn id="3" fill="hold">
+                      <p:stCondLst>
+                        <p:cond delay="indefinite"/>
+                      </p:stCondLst>
+                      <p:childTnLst>
+                        <p:par>
+                          <p:cTn id="4" fill="hold">
+                            <p:stCondLst>
+                              <p:cond delay="0"/>
+                            </p:stCondLst>
+                            <p:childTnLst>
+                              <p:par>
+                                <p:cTn id="5" presetID="1" presetClass="entr" presetSubtype="0" fill="hold" nodeType="clickEffect">
+                                  <p:stCondLst>
+                                    <p:cond delay="0"/>
+                                  </p:stCondLst>
+                                  <p:childTnLst>
+                                    <p:set>
+                                      <p:cBhvr>
+                                        <p:cTn id="6" dur="1" fill="hold">
+                                          <p:stCondLst>
+                                            <p:cond delay="0"/>
+                                          </p:stCondLst>
+                                        </p:cTn>
+                                        <p:tgtEl>
+                                          <p:spTgt spid="3">
+                                            <p:txEl>
+                                              <p:pRg st="1" end="1"/>
+                                            </p:txEl>
+                                          </p:spTgt>
+                                        </p:tgtEl>
+                                        <p:attrNameLst>
+                                          <p:attrName>style.visibility</p:attrName>
+                                        </p:attrNameLst>
+                                      </p:cBhvr>
+                                      <p:to>
+                                        <p:strVal val="visible"/>
+                                      </p:to>
+                                    </p:set>
+                                  </p:childTnLst>
+                                </p:cTn>
+                              </p:par>
+                              <p:par>
+                                <p:cTn id="7" presetID="1" presetClass="entr" presetSubtype="0" fill="hold" nodeType="withEffect">
+                                  <p:stCondLst>
+                                    <p:cond delay="0"/>
+                                  </p:stCondLst>
+                                  <p:childTnLst>
+                                    <p:set>
+                                      <p:cBhvr>
+                                        <p:cTn id="8" dur="1" fill="hold">
+                                          <p:stCondLst>
+                                            <p:cond delay="0"/>
+                                          </p:stCondLst>
+                                        </p:cTn>
+                                        <p:tgtEl>
+                                          <p:spTgt spid="3">
+                                            <p:txEl>
+                                              <p:pRg st="2" end="2"/>
+                                            </p:txEl>
+                                          </p:spTgt>
+                                        </p:tgtEl>
+                                        <p:attrNameLst>
+                                          <p:attrName>style.visibility</p:attrName>
+                                        </p:attrNameLst>
+                                      </p:cBhvr>
+                                      <p:to>
+                                        <p:strVal val="visible"/>
+                                      </p:to>
+                                    </p:set>
+                                  </p:childTnLst>
+                                </p:cTn>
+                              </p:par>
+                              <p:par>
+                                <p:cTn id="9" presetID="1" presetClass="entr" presetSubtype="0" fill="hold" nodeType="withEffect">
+                                  <p:stCondLst>
+                                    <p:cond delay="0"/>
+                                  </p:stCondLst>
+                                  <p:childTnLst>
+                                    <p:set>
+                                      <p:cBhvr>
+                                        <p:cTn id="10" dur="1" fill="hold">
+                                          <p:stCondLst>
+                                            <p:cond delay="0"/>
+                                          </p:stCondLst>
+                                        </p:cTn>
+                                        <p:tgtEl>
+                                          <p:spTgt spid="3">
+                                            <p:txEl>
+                                              <p:pRg st="3" end="3"/>
+                                            </p:txEl>
+                                          </p:spTgt>
+                                        </p:tgtEl>
+                                        <p:attrNameLst>
+                                          <p:attrName>style.visibility</p:attrName>
+                                        </p:attrNameLst>
+                                      </p:cBhvr>
+                                      <p:to>
+                                        <p:strVal val="visible"/>
+                                      </p:to>
+                                    </p:set>
+                                  </p:childTnLst>
+                                </p:cTn>
+                              </p:par>
+                            </p:childTnLst>
+                          </p:cTn>
+                        </p:par>
+                      </p:childTnLst>
+                    </p:cTn>
+                  </p:par>
+                  <p:par>
+                    <p:cTn id="11" fill="hold">
+                      <p:stCondLst>
+                        <p:cond delay="indefinite"/>
+                      </p:stCondLst>
+                      <p:childTnLst>
+                        <p:par>
+                          <p:cTn id="12" fill="hold">
+                            <p:stCondLst>
+                              <p:cond delay="0"/>
+                            </p:stCondLst>
+                            <p:childTnLst>
+                              <p:par>
+                                <p:cTn id="13" presetID="1" presetClass="entr" presetSubtype="0" fill="hold" nodeType="clickEffect">
+                                  <p:stCondLst>
+                                    <p:cond delay="0"/>
+                                  </p:stCondLst>
+                                  <p:childTnLst>
+                                    <p:set>
+                                      <p:cBhvr>
+                                        <p:cTn id="14" dur="1" fill="hold">
+                                          <p:stCondLst>
+                                            <p:cond delay="0"/>
+                                          </p:stCondLst>
+                                        </p:cTn>
+                                        <p:tgtEl>
+                                          <p:spTgt spid="3">
+                                            <p:txEl>
+                                              <p:pRg st="4" end="4"/>
+                                            </p:txEl>
+                                          </p:spTgt>
+                                        </p:tgtEl>
+                                        <p:attrNameLst>
+                                          <p:attrName>style.visibility</p:attrName>
+                                        </p:attrNameLst>
+                                      </p:cBhvr>
+                                      <p:to>
+                                        <p:strVal val="visible"/>
+                                      </p:to>
+                                    </p:set>
+                                  </p:childTnLst>
+                                </p:cTn>
+                              </p:par>
+                              <p:par>
+                                <p:cTn id="15" presetID="1" presetClass="entr" presetSubtype="0" fill="hold" nodeType="withEffect">
+                                  <p:stCondLst>
+                                    <p:cond delay="0"/>
+                                  </p:stCondLst>
+                                  <p:childTnLst>
+                                    <p:set>
+                                      <p:cBhvr>
+                                        <p:cTn id="16" dur="1" fill="hold">
+                                          <p:stCondLst>
+                                            <p:cond delay="0"/>
+                                          </p:stCondLst>
+                                        </p:cTn>
+                                        <p:tgtEl>
+                                          <p:spTgt spid="3">
+                                            <p:txEl>
+                                              <p:pRg st="5" end="5"/>
+                                            </p:txEl>
+                                          </p:spTgt>
+                                        </p:tgtEl>
+                                        <p:attrNameLst>
+                                          <p:attrName>style.visibility</p:attrName>
+                                        </p:attrNameLst>
+                                      </p:cBhvr>
+                                      <p:to>
+                                        <p:strVal val="visible"/>
+                                      </p:to>
+                                    </p:set>
+                                  </p:childTnLst>
+                                </p:cTn>
+                              </p:par>
+                              <p:par>
+                                <p:cTn id="17" presetID="1" presetClass="entr" presetSubtype="0" fill="hold" nodeType="withEffect">
+                                  <p:stCondLst>
+                                    <p:cond delay="0"/>
+                                  </p:stCondLst>
+                                  <p:childTnLst>
+                                    <p:set>
+                                      <p:cBhvr>
+                                        <p:cTn id="18" dur="1" fill="hold">
+                                          <p:stCondLst>
+                                            <p:cond delay="0"/>
+                                          </p:stCondLst>
+                                        </p:cTn>
+                                        <p:tgtEl>
+                                          <p:spTgt spid="3">
+                                            <p:txEl>
+                                              <p:pRg st="6" end="6"/>
+                                            </p:txEl>
+                                          </p:spTgt>
+                                        </p:tgtEl>
+                                        <p:attrNameLst>
+                                          <p:attrName>style.visibility</p:attrName>
+                                        </p:attrNameLst>
+                                      </p:cBhvr>
+                                      <p:to>
+                                        <p:strVal val="visible"/>
+                                      </p:to>
+                                    </p:set>
+                                  </p:childTnLst>
+                                </p:cTn>
+                              </p:par>
+                            </p:childTnLst>
+                          </p:cTn>
+                        </p:par>
+                      </p:childTnLst>
+                    </p:cTn>
+                  </p:par>
+                  <p:par>
+                    <p:cTn id="19" fill="hold">
+                      <p:stCondLst>
+                        <p:cond delay="indefinite"/>
+                      </p:stCondLst>
+                      <p:childTnLst>
+                        <p:par>
+                          <p:cTn id="20" fill="hold">
+                            <p:stCondLst>
+                              <p:cond delay="0"/>
+                            </p:stCondLst>
+                            <p:childTnLst>
+                              <p:par>
+                                <p:cTn id="21" presetID="1" presetClass="entr" presetSubtype="0" fill="hold" nodeType="clickEffect">
+                                  <p:stCondLst>
+                                    <p:cond delay="0"/>
+                                  </p:stCondLst>
+                                  <p:childTnLst>
+                                    <p:set>
+                                      <p:cBhvr>
+                                        <p:cTn id="22" dur="1" fill="hold">
+                                          <p:stCondLst>
+                                            <p:cond delay="0"/>
+                                          </p:stCondLst>
+                                        </p:cTn>
+                                        <p:tgtEl>
+                                          <p:spTgt spid="3">
+                                            <p:txEl>
+                                              <p:pRg st="7" end="7"/>
+                                            </p:txEl>
+                                          </p:spTgt>
+                                        </p:tgtEl>
+                                        <p:attrNameLst>
+                                          <p:attrName>style.visibility</p:attrName>
+                                        </p:attrNameLst>
+                                      </p:cBhvr>
+                                      <p:to>
+                                        <p:strVal val="visible"/>
+                                      </p:to>
+                                    </p:set>
+                                  </p:childTnLst>
+                                </p:cTn>
+                              </p:par>
+                              <p:par>
+                                <p:cTn id="23" presetID="1" presetClass="entr" presetSubtype="0" fill="hold" nodeType="withEffect">
+                                  <p:stCondLst>
+                                    <p:cond delay="0"/>
+                                  </p:stCondLst>
+                                  <p:childTnLst>
+                                    <p:set>
+                                      <p:cBhvr>
+                                        <p:cTn id="24" dur="1" fill="hold">
+                                          <p:stCondLst>
+                                            <p:cond delay="0"/>
+                                          </p:stCondLst>
+                                        </p:cTn>
+                                        <p:tgtEl>
+                                          <p:spTgt spid="3">
+                                            <p:txEl>
+                                              <p:pRg st="8" end="8"/>
+                                            </p:txEl>
+                                          </p:spTgt>
+                                        </p:tgtEl>
+                                        <p:attrNameLst>
+                                          <p:attrName>style.visibility</p:attrName>
+                                        </p:attrNameLst>
+                                      </p:cBhvr>
+                                      <p:to>
+                                        <p:strVal val="visible"/>
+                                      </p:to>
+                                    </p:set>
+                                  </p:childTnLst>
+                                </p:cTn>
+                              </p:par>
+                              <p:par>
+                                <p:cTn id="25" presetID="1" presetClass="entr" presetSubtype="0" fill="hold" nodeType="withEffect">
+                                  <p:stCondLst>
+                                    <p:cond delay="0"/>
+                                  </p:stCondLst>
+                                  <p:childTnLst>
+                                    <p:set>
+                                      <p:cBhvr>
+                                        <p:cTn id="26" dur="1" fill="hold">
+                                          <p:stCondLst>
+                                            <p:cond delay="0"/>
+                                          </p:stCondLst>
+                                        </p:cTn>
+                                        <p:tgtEl>
+                                          <p:spTgt spid="3">
+                                            <p:txEl>
+                                              <p:pRg st="9" end="9"/>
+                                            </p:txEl>
+                                          </p:spTgt>
+                                        </p:tgtEl>
+                                        <p:attrNameLst>
+                                          <p:attrName>style.visibility</p:attrName>
+                                        </p:attrNameLst>
+                                      </p:cBhvr>
+                                      <p:to>
+                                        <p:strVal val="visible"/>
+                                      </p:to>
+                                    </p:set>
+                                  </p:childTnLst>
+                                </p:cTn>
+                              </p:par>
+                              <p:par>
+                                <p:cTn id="27" presetID="1" presetClass="entr" presetSubtype="0" fill="hold" nodeType="withEffect">
+                                  <p:stCondLst>
+                                    <p:cond delay="0"/>
+                                  </p:stCondLst>
+                                  <p:childTnLst>
+                                    <p:set>
+                                      <p:cBhvr>
+                                        <p:cTn id="28" dur="1" fill="hold">
+                                          <p:stCondLst>
+                                            <p:cond delay="0"/>
+                                          </p:stCondLst>
+                                        </p:cTn>
+                                        <p:tgtEl>
+                                          <p:spTgt spid="3">
+                                            <p:txEl>
+                                              <p:pRg st="10" end="10"/>
+                                            </p:txEl>
+                                          </p:spTgt>
+                                        </p:tgtEl>
+                                        <p:attrNameLst>
+                                          <p:attrName>style.visibility</p:attrName>
+                                        </p:attrNameLst>
+                                      </p:cBhvr>
+                                      <p:to>
+                                        <p:strVal val="visible"/>
+                                      </p:to>
+                                    </p:set>
+                                  </p:childTnLst>
+                                </p:cTn>
+                              </p:par>
+                            </p:childTnLst>
+                          </p:cTn>
+                        </p:par>
+                      </p:childTnLst>
+                    </p:cTn>
+                  </p:par>
+                </p:childTnLst>
+              </p:cTn>
+              <p:prevCondLst>
+                <p:cond evt="onPrev" delay="0">
+                  <p:tgtEl>
+                    <p:sldTgt/>
+                  </p:tgtEl>
+                </p:cond>
+              </p:prevCondLst>
+              <p:nextCondLst>
+                <p:cond evt="onNext" delay="0">
+                  <p:tgtEl>
+                    <p:sldTgt/>
+                  </p:tgtEl>
+                </p:cond>
+              </p:nextCondLst>
+            </p:seq>
+          </p:childTnLst>
+        </p:cTn>
+      </p:par>
+    </p:tnLst>
+  </p:timing>
 </p:sld>
 </file>
 
@@ -9487,56 +9881,90 @@
               <a:buNone/>
             </a:pPr>
             <a:r>
+              <a:rPr lang="en-US" b="1" dirty="0"/>
+              <a:t>Information retrieval </a:t>
+            </a:r>
+            <a:r>
               <a:rPr lang="en-US" dirty="0"/>
-              <a:t>Focus on introducing graph theory through web search   </a:t>
+              <a:t>is a foundation of many data mining tasks      </a:t>
             </a:r>
           </a:p>
           <a:p>
             <a:r>
               <a:rPr lang="en-US" dirty="0"/>
-              <a:t>Introduction to the </a:t>
+              <a:t>Tasks include </a:t>
             </a:r>
             <a:r>
               <a:rPr lang="en-US" b="1" dirty="0"/>
-              <a:t>web search </a:t>
+              <a:t>web search</a:t>
             </a:r>
             <a:r>
               <a:rPr lang="en-US" dirty="0"/>
-              <a:t>problem and </a:t>
+              <a:t>, </a:t>
             </a:r>
             <a:r>
               <a:rPr lang="en-US" b="1" dirty="0"/>
-              <a:t>information retrieval </a:t>
-            </a:r>
-          </a:p>
-          <a:p>
+              <a:t>recommenders</a:t>
+            </a:r>
             <a:r>
               <a:rPr lang="en-US" dirty="0"/>
-              <a:t>Appyling vector search for information retrieval </a:t>
+              <a:t>, and </a:t>
+            </a:r>
+            <a:r>
+              <a:rPr lang="en-US" b="1" dirty="0"/>
+              <a:t>RAG systems  </a:t>
             </a:r>
           </a:p>
           <a:p>
             <a:r>
               <a:rPr lang="en-US" dirty="0"/>
-              <a:t>Brief introduction to dense text embedding with the BERT family of models</a:t>
+              <a:t>Vector search is core to information retrieval </a:t>
             </a:r>
           </a:p>
           <a:p>
             <a:r>
               <a:rPr lang="en-US" dirty="0"/>
-              <a:t>Sparse text embedding models</a:t>
-            </a:r>
-          </a:p>
-          <a:p>
+              <a:t>Vector search requires embedding </a:t>
+            </a:r>
+          </a:p>
+          <a:p>
+            <a:pPr lvl="1"/>
             <a:r>
               <a:rPr lang="en-US" dirty="0"/>
-              <a:t>Sparse-dense information retrieval pipelines</a:t>
-            </a:r>
-          </a:p>
-          <a:p>
+              <a:t>Dense embedding BERT family of models</a:t>
+            </a:r>
+          </a:p>
+          <a:p>
+            <a:pPr lvl="1"/>
             <a:r>
               <a:rPr lang="en-US" dirty="0"/>
-              <a:t>SPLADE models for single stage retrieval</a:t>
+              <a:t>Sparse text embedding models, e.g. BM25</a:t>
+            </a:r>
+          </a:p>
+          <a:p>
+            <a:r>
+              <a:rPr lang="en-US" dirty="0"/>
+              <a:t>Sparse-dense information retrieval pipelines improve performance</a:t>
+            </a:r>
+          </a:p>
+          <a:p>
+            <a:pPr lvl="1"/>
+            <a:r>
+              <a:rPr lang="en-US" dirty="0"/>
+              <a:t>Efficient search for large number of potential results  </a:t>
+            </a:r>
+          </a:p>
+          <a:p>
+            <a:pPr lvl="1"/>
+            <a:r>
+              <a:rPr lang="en-US" dirty="0"/>
+              <a:t>Reranking improves overall results </a:t>
+            </a:r>
+          </a:p>
+          <a:p>
+            <a:r>
+              <a:rPr lang="en-US" dirty="0"/>
+              <a:t>SPLADE models for improve sparse embedding</a:t>
             </a:r>
           </a:p>
           <a:p>
@@ -9563,6 +9991,454 @@
   <p:clrMapOvr>
     <a:masterClrMapping/>
   </p:clrMapOvr>
+  <p:timing>
+    <p:tnLst>
+      <p:par>
+        <p:cTn id="1" dur="indefinite" restart="never" nodeType="tmRoot">
+          <p:childTnLst>
+            <p:seq concurrent="1" nextAc="seek">
+              <p:cTn id="2" dur="indefinite" nodeType="mainSeq">
+                <p:childTnLst>
+                  <p:par>
+                    <p:cTn id="3" fill="hold">
+                      <p:stCondLst>
+                        <p:cond delay="indefinite"/>
+                      </p:stCondLst>
+                      <p:childTnLst>
+                        <p:par>
+                          <p:cTn id="4" fill="hold">
+                            <p:stCondLst>
+                              <p:cond delay="0"/>
+                            </p:stCondLst>
+                            <p:childTnLst>
+                              <p:par>
+                                <p:cTn id="5" presetID="1" presetClass="entr" presetSubtype="0" fill="hold" nodeType="clickEffect">
+                                  <p:stCondLst>
+                                    <p:cond delay="0"/>
+                                  </p:stCondLst>
+                                  <p:childTnLst>
+                                    <p:set>
+                                      <p:cBhvr>
+                                        <p:cTn id="6" dur="1" fill="hold">
+                                          <p:stCondLst>
+                                            <p:cond delay="0"/>
+                                          </p:stCondLst>
+                                        </p:cTn>
+                                        <p:tgtEl>
+                                          <p:spTgt spid="3">
+                                            <p:txEl>
+                                              <p:pRg st="1" end="1"/>
+                                            </p:txEl>
+                                          </p:spTgt>
+                                        </p:tgtEl>
+                                        <p:attrNameLst>
+                                          <p:attrName>style.visibility</p:attrName>
+                                        </p:attrNameLst>
+                                      </p:cBhvr>
+                                      <p:to>
+                                        <p:strVal val="visible"/>
+                                      </p:to>
+                                    </p:set>
+                                  </p:childTnLst>
+                                </p:cTn>
+                              </p:par>
+                            </p:childTnLst>
+                          </p:cTn>
+                        </p:par>
+                      </p:childTnLst>
+                    </p:cTn>
+                  </p:par>
+                  <p:par>
+                    <p:cTn id="7" fill="hold">
+                      <p:stCondLst>
+                        <p:cond delay="indefinite"/>
+                      </p:stCondLst>
+                      <p:childTnLst>
+                        <p:par>
+                          <p:cTn id="8" fill="hold">
+                            <p:stCondLst>
+                              <p:cond delay="0"/>
+                            </p:stCondLst>
+                            <p:childTnLst>
+                              <p:par>
+                                <p:cTn id="9" presetID="1" presetClass="entr" presetSubtype="0" fill="hold" nodeType="clickEffect">
+                                  <p:stCondLst>
+                                    <p:cond delay="0"/>
+                                  </p:stCondLst>
+                                  <p:childTnLst>
+                                    <p:set>
+                                      <p:cBhvr>
+                                        <p:cTn id="10" dur="1" fill="hold">
+                                          <p:stCondLst>
+                                            <p:cond delay="0"/>
+                                          </p:stCondLst>
+                                        </p:cTn>
+                                        <p:tgtEl>
+                                          <p:spTgt spid="3">
+                                            <p:txEl>
+                                              <p:pRg st="2" end="2"/>
+                                            </p:txEl>
+                                          </p:spTgt>
+                                        </p:tgtEl>
+                                        <p:attrNameLst>
+                                          <p:attrName>style.visibility</p:attrName>
+                                        </p:attrNameLst>
+                                      </p:cBhvr>
+                                      <p:to>
+                                        <p:strVal val="visible"/>
+                                      </p:to>
+                                    </p:set>
+                                  </p:childTnLst>
+                                </p:cTn>
+                              </p:par>
+                            </p:childTnLst>
+                          </p:cTn>
+                        </p:par>
+                      </p:childTnLst>
+                    </p:cTn>
+                  </p:par>
+                  <p:par>
+                    <p:cTn id="11" fill="hold">
+                      <p:stCondLst>
+                        <p:cond delay="indefinite"/>
+                      </p:stCondLst>
+                      <p:childTnLst>
+                        <p:par>
+                          <p:cTn id="12" fill="hold">
+                            <p:stCondLst>
+                              <p:cond delay="0"/>
+                            </p:stCondLst>
+                            <p:childTnLst>
+                              <p:par>
+                                <p:cTn id="13" presetID="1" presetClass="entr" presetSubtype="0" fill="hold" nodeType="clickEffect">
+                                  <p:stCondLst>
+                                    <p:cond delay="0"/>
+                                  </p:stCondLst>
+                                  <p:childTnLst>
+                                    <p:set>
+                                      <p:cBhvr>
+                                        <p:cTn id="14" dur="1" fill="hold">
+                                          <p:stCondLst>
+                                            <p:cond delay="0"/>
+                                          </p:stCondLst>
+                                        </p:cTn>
+                                        <p:tgtEl>
+                                          <p:spTgt spid="3">
+                                            <p:txEl>
+                                              <p:pRg st="3" end="3"/>
+                                            </p:txEl>
+                                          </p:spTgt>
+                                        </p:tgtEl>
+                                        <p:attrNameLst>
+                                          <p:attrName>style.visibility</p:attrName>
+                                        </p:attrNameLst>
+                                      </p:cBhvr>
+                                      <p:to>
+                                        <p:strVal val="visible"/>
+                                      </p:to>
+                                    </p:set>
+                                  </p:childTnLst>
+                                </p:cTn>
+                              </p:par>
+                              <p:par>
+                                <p:cTn id="15" presetID="1" presetClass="entr" presetSubtype="0" fill="hold" nodeType="withEffect">
+                                  <p:stCondLst>
+                                    <p:cond delay="0"/>
+                                  </p:stCondLst>
+                                  <p:childTnLst>
+                                    <p:set>
+                                      <p:cBhvr>
+                                        <p:cTn id="16" dur="1" fill="hold">
+                                          <p:stCondLst>
+                                            <p:cond delay="0"/>
+                                          </p:stCondLst>
+                                        </p:cTn>
+                                        <p:tgtEl>
+                                          <p:spTgt spid="3">
+                                            <p:txEl>
+                                              <p:pRg st="4" end="4"/>
+                                            </p:txEl>
+                                          </p:spTgt>
+                                        </p:tgtEl>
+                                        <p:attrNameLst>
+                                          <p:attrName>style.visibility</p:attrName>
+                                        </p:attrNameLst>
+                                      </p:cBhvr>
+                                      <p:to>
+                                        <p:strVal val="visible"/>
+                                      </p:to>
+                                    </p:set>
+                                  </p:childTnLst>
+                                </p:cTn>
+                              </p:par>
+                              <p:par>
+                                <p:cTn id="17" presetID="1" presetClass="entr" presetSubtype="0" fill="hold" nodeType="withEffect">
+                                  <p:stCondLst>
+                                    <p:cond delay="0"/>
+                                  </p:stCondLst>
+                                  <p:childTnLst>
+                                    <p:set>
+                                      <p:cBhvr>
+                                        <p:cTn id="18" dur="1" fill="hold">
+                                          <p:stCondLst>
+                                            <p:cond delay="0"/>
+                                          </p:stCondLst>
+                                        </p:cTn>
+                                        <p:tgtEl>
+                                          <p:spTgt spid="3">
+                                            <p:txEl>
+                                              <p:pRg st="5" end="5"/>
+                                            </p:txEl>
+                                          </p:spTgt>
+                                        </p:tgtEl>
+                                        <p:attrNameLst>
+                                          <p:attrName>style.visibility</p:attrName>
+                                        </p:attrNameLst>
+                                      </p:cBhvr>
+                                      <p:to>
+                                        <p:strVal val="visible"/>
+                                      </p:to>
+                                    </p:set>
+                                  </p:childTnLst>
+                                </p:cTn>
+                              </p:par>
+                            </p:childTnLst>
+                          </p:cTn>
+                        </p:par>
+                      </p:childTnLst>
+                    </p:cTn>
+                  </p:par>
+                  <p:par>
+                    <p:cTn id="19" fill="hold">
+                      <p:stCondLst>
+                        <p:cond delay="indefinite"/>
+                      </p:stCondLst>
+                      <p:childTnLst>
+                        <p:par>
+                          <p:cTn id="20" fill="hold">
+                            <p:stCondLst>
+                              <p:cond delay="0"/>
+                            </p:stCondLst>
+                            <p:childTnLst>
+                              <p:par>
+                                <p:cTn id="21" presetID="1" presetClass="entr" presetSubtype="0" fill="hold" nodeType="clickEffect">
+                                  <p:stCondLst>
+                                    <p:cond delay="0"/>
+                                  </p:stCondLst>
+                                  <p:childTnLst>
+                                    <p:set>
+                                      <p:cBhvr>
+                                        <p:cTn id="22" dur="1" fill="hold">
+                                          <p:stCondLst>
+                                            <p:cond delay="0"/>
+                                          </p:stCondLst>
+                                        </p:cTn>
+                                        <p:tgtEl>
+                                          <p:spTgt spid="3">
+                                            <p:txEl>
+                                              <p:pRg st="6" end="6"/>
+                                            </p:txEl>
+                                          </p:spTgt>
+                                        </p:tgtEl>
+                                        <p:attrNameLst>
+                                          <p:attrName>style.visibility</p:attrName>
+                                        </p:attrNameLst>
+                                      </p:cBhvr>
+                                      <p:to>
+                                        <p:strVal val="visible"/>
+                                      </p:to>
+                                    </p:set>
+                                  </p:childTnLst>
+                                </p:cTn>
+                              </p:par>
+                              <p:par>
+                                <p:cTn id="23" presetID="1" presetClass="entr" presetSubtype="0" fill="hold" nodeType="withEffect">
+                                  <p:stCondLst>
+                                    <p:cond delay="0"/>
+                                  </p:stCondLst>
+                                  <p:childTnLst>
+                                    <p:set>
+                                      <p:cBhvr>
+                                        <p:cTn id="24" dur="1" fill="hold">
+                                          <p:stCondLst>
+                                            <p:cond delay="0"/>
+                                          </p:stCondLst>
+                                        </p:cTn>
+                                        <p:tgtEl>
+                                          <p:spTgt spid="3">
+                                            <p:txEl>
+                                              <p:pRg st="7" end="7"/>
+                                            </p:txEl>
+                                          </p:spTgt>
+                                        </p:tgtEl>
+                                        <p:attrNameLst>
+                                          <p:attrName>style.visibility</p:attrName>
+                                        </p:attrNameLst>
+                                      </p:cBhvr>
+                                      <p:to>
+                                        <p:strVal val="visible"/>
+                                      </p:to>
+                                    </p:set>
+                                  </p:childTnLst>
+                                </p:cTn>
+                              </p:par>
+                              <p:par>
+                                <p:cTn id="25" presetID="1" presetClass="entr" presetSubtype="0" fill="hold" nodeType="withEffect">
+                                  <p:stCondLst>
+                                    <p:cond delay="0"/>
+                                  </p:stCondLst>
+                                  <p:childTnLst>
+                                    <p:set>
+                                      <p:cBhvr>
+                                        <p:cTn id="26" dur="1" fill="hold">
+                                          <p:stCondLst>
+                                            <p:cond delay="0"/>
+                                          </p:stCondLst>
+                                        </p:cTn>
+                                        <p:tgtEl>
+                                          <p:spTgt spid="3">
+                                            <p:txEl>
+                                              <p:pRg st="8" end="8"/>
+                                            </p:txEl>
+                                          </p:spTgt>
+                                        </p:tgtEl>
+                                        <p:attrNameLst>
+                                          <p:attrName>style.visibility</p:attrName>
+                                        </p:attrNameLst>
+                                      </p:cBhvr>
+                                      <p:to>
+                                        <p:strVal val="visible"/>
+                                      </p:to>
+                                    </p:set>
+                                  </p:childTnLst>
+                                </p:cTn>
+                              </p:par>
+                            </p:childTnLst>
+                          </p:cTn>
+                        </p:par>
+                      </p:childTnLst>
+                    </p:cTn>
+                  </p:par>
+                  <p:par>
+                    <p:cTn id="27" fill="hold">
+                      <p:stCondLst>
+                        <p:cond delay="indefinite"/>
+                      </p:stCondLst>
+                      <p:childTnLst>
+                        <p:par>
+                          <p:cTn id="28" fill="hold">
+                            <p:stCondLst>
+                              <p:cond delay="0"/>
+                            </p:stCondLst>
+                            <p:childTnLst>
+                              <p:par>
+                                <p:cTn id="29" presetID="1" presetClass="entr" presetSubtype="0" fill="hold" nodeType="clickEffect">
+                                  <p:stCondLst>
+                                    <p:cond delay="0"/>
+                                  </p:stCondLst>
+                                  <p:childTnLst>
+                                    <p:set>
+                                      <p:cBhvr>
+                                        <p:cTn id="30" dur="1" fill="hold">
+                                          <p:stCondLst>
+                                            <p:cond delay="0"/>
+                                          </p:stCondLst>
+                                        </p:cTn>
+                                        <p:tgtEl>
+                                          <p:spTgt spid="3">
+                                            <p:txEl>
+                                              <p:pRg st="9" end="9"/>
+                                            </p:txEl>
+                                          </p:spTgt>
+                                        </p:tgtEl>
+                                        <p:attrNameLst>
+                                          <p:attrName>style.visibility</p:attrName>
+                                        </p:attrNameLst>
+                                      </p:cBhvr>
+                                      <p:to>
+                                        <p:strVal val="visible"/>
+                                      </p:to>
+                                    </p:set>
+                                  </p:childTnLst>
+                                </p:cTn>
+                              </p:par>
+                            </p:childTnLst>
+                          </p:cTn>
+                        </p:par>
+                      </p:childTnLst>
+                    </p:cTn>
+                  </p:par>
+                  <p:par>
+                    <p:cTn id="31" fill="hold">
+                      <p:stCondLst>
+                        <p:cond delay="indefinite"/>
+                      </p:stCondLst>
+                      <p:childTnLst>
+                        <p:par>
+                          <p:cTn id="32" fill="hold">
+                            <p:stCondLst>
+                              <p:cond delay="0"/>
+                            </p:stCondLst>
+                            <p:childTnLst>
+                              <p:par>
+                                <p:cTn id="33" presetID="1" presetClass="entr" presetSubtype="0" fill="hold" nodeType="clickEffect">
+                                  <p:stCondLst>
+                                    <p:cond delay="0"/>
+                                  </p:stCondLst>
+                                  <p:childTnLst>
+                                    <p:set>
+                                      <p:cBhvr>
+                                        <p:cTn id="34" dur="1" fill="hold">
+                                          <p:stCondLst>
+                                            <p:cond delay="0"/>
+                                          </p:stCondLst>
+                                        </p:cTn>
+                                        <p:tgtEl>
+                                          <p:spTgt spid="3">
+                                            <p:txEl>
+                                              <p:pRg st="10" end="10"/>
+                                            </p:txEl>
+                                          </p:spTgt>
+                                        </p:tgtEl>
+                                        <p:attrNameLst>
+                                          <p:attrName>style.visibility</p:attrName>
+                                        </p:attrNameLst>
+                                      </p:cBhvr>
+                                      <p:to>
+                                        <p:strVal val="visible"/>
+                                      </p:to>
+                                    </p:set>
+                                  </p:childTnLst>
+                                </p:cTn>
+                              </p:par>
+                            </p:childTnLst>
+                          </p:cTn>
+                        </p:par>
+                      </p:childTnLst>
+                    </p:cTn>
+                  </p:par>
+                </p:childTnLst>
+              </p:cTn>
+              <p:prevCondLst>
+                <p:cond evt="onPrev" delay="0">
+                  <p:tgtEl>
+                    <p:sldTgt/>
+                  </p:tgtEl>
+                </p:cond>
+              </p:prevCondLst>
+              <p:nextCondLst>
+                <p:cond evt="onNext" delay="0">
+                  <p:tgtEl>
+                    <p:sldTgt/>
+                  </p:tgtEl>
+                </p:cond>
+              </p:nextCondLst>
+            </p:seq>
+          </p:childTnLst>
+        </p:cTn>
+      </p:par>
+    </p:tnLst>
+  </p:timing>
 </p:sld>
 </file>
 
@@ -18706,219 +19582,126 @@
               <a:rPr lang="en-US" sz="4000" dirty="0">
                 <a:latin typeface="+mn-lt"/>
               </a:rPr>
-              <a:t>Introduction to Web Searching</a:t>
+              <a:t>Information Retrieval </a:t>
             </a:r>
           </a:p>
         </p:txBody>
       </p:sp>
-      <mc:AlternateContent xmlns:mc="http://schemas.openxmlformats.org/markup-compatibility/2006" xmlns:a14="http://schemas.microsoft.com/office/drawing/2010/main">
-        <mc:Choice Requires="a14">
-          <p:sp>
-            <p:nvSpPr>
-              <p:cNvPr id="3" name="Content Placeholder 2">
-                <a:extLst>
-                  <a:ext uri="{FF2B5EF4-FFF2-40B4-BE49-F238E27FC236}">
-                    <a16:creationId xmlns:a16="http://schemas.microsoft.com/office/drawing/2014/main" id="{D9C502E2-3889-41D4-9A2E-D8C04ADE5184}"/>
-                  </a:ext>
-                </a:extLst>
-              </p:cNvPr>
-              <p:cNvSpPr>
-                <a:spLocks noGrp="1"/>
-              </p:cNvSpPr>
-              <p:nvPr>
-                <p:ph idx="1"/>
-              </p:nvPr>
-            </p:nvSpPr>
-            <p:spPr>
-              <a:xfrm>
-                <a:off x="838200" y="1291525"/>
-                <a:ext cx="10515600" cy="5350779"/>
-              </a:xfrm>
-            </p:spPr>
-            <p:txBody>
-              <a:bodyPr>
-                <a:normAutofit fontScale="92500" lnSpcReduction="10000"/>
-              </a:bodyPr>
-              <a:lstStyle/>
-              <a:p>
-                <a:pPr marL="0" indent="0">
-                  <a:buNone/>
-                </a:pPr>
-                <a:r>
-                  <a:rPr lang="en-US" b="1" dirty="0"/>
-                  <a:t>Web search </a:t>
-                </a:r>
-                <a:r>
-                  <a:rPr lang="en-US" dirty="0"/>
-                  <a:t>is undoubtedly the most widely used data mining application</a:t>
-                </a:r>
-                <a:endParaRPr lang="en-US" b="1" dirty="0"/>
-              </a:p>
-              <a:p>
-                <a:r>
-                  <a:rPr lang="en-US" dirty="0"/>
-                  <a:t>Major search engines, like Google, Bing, Yahoo!, Baidu are complex</a:t>
-                </a:r>
-              </a:p>
-              <a:p>
-                <a:pPr lvl="1"/>
-                <a:r>
-                  <a:rPr lang="en-US" dirty="0"/>
-                  <a:t>Employ multiple algorithms </a:t>
-                </a:r>
-              </a:p>
-              <a:p>
-                <a:pPr lvl="1"/>
-                <a:r>
-                  <a:rPr lang="en-US" dirty="0"/>
-                  <a:t>Based on page content and hyperlinks</a:t>
-                </a:r>
-              </a:p>
-              <a:p>
-                <a:pPr lvl="1"/>
-                <a:r>
-                  <a:rPr lang="en-US" dirty="0"/>
-                  <a:t>Typically use other information – e.g. user profiles and history</a:t>
-                </a:r>
-              </a:p>
-              <a:p>
-                <a:r>
-                  <a:rPr lang="en-US" dirty="0"/>
-                  <a:t>Complexity arises from:</a:t>
-                </a:r>
-              </a:p>
-              <a:p>
-                <a:pPr lvl="1"/>
-                <a:r>
-                  <a:rPr lang="en-US" dirty="0"/>
-                  <a:t>Massive data volumes </a:t>
-                </a:r>
-              </a:p>
-              <a:p>
-                <a:pPr lvl="1"/>
-                <a:r>
-                  <a:rPr lang="en-US" dirty="0"/>
-                  <a:t>Unlimited number of possible queries - can’t really know user intent</a:t>
-                </a:r>
-              </a:p>
-              <a:p>
-                <a:pPr lvl="1"/>
-                <a:r>
-                  <a:rPr lang="en-US" dirty="0"/>
-                  <a:t>Pages in many formats, text, images, videos, documents, etc. </a:t>
-                </a:r>
-              </a:p>
-              <a:p>
-                <a:pPr lvl="1"/>
-                <a:r>
-                  <a:rPr lang="en-US" dirty="0"/>
-                  <a:t>Web spam</a:t>
-                </a:r>
-              </a:p>
-              <a:p>
-                <a:pPr lvl="1"/>
-                <a:r>
-                  <a:rPr lang="en-US" dirty="0"/>
-                  <a:t>Enormous number of topics</a:t>
-                </a:r>
-              </a:p>
-              <a:p>
-                <a:r>
-                  <a:rPr lang="en-US" dirty="0"/>
-                  <a:t>Small number of large companies dominate search   </a:t>
-                </a:r>
-              </a:p>
-              <a:p>
-                <a:pPr lvl="1"/>
-                <a:r>
-                  <a:rPr lang="en-US" dirty="0"/>
-                  <a:t>Google’s US market share </a:t>
-                </a:r>
-                <a14:m>
-                  <m:oMath xmlns:m="http://schemas.openxmlformats.org/officeDocument/2006/math">
-                    <m:r>
-                      <a:rPr lang="en-US" i="1" smtClean="0">
-                        <a:latin typeface="Cambria Math" panose="02040503050406030204" pitchFamily="18" charset="0"/>
-                        <a:ea typeface="Cambria Math" panose="02040503050406030204" pitchFamily="18" charset="0"/>
-                      </a:rPr>
-                      <m:t>~</m:t>
-                    </m:r>
-                    <m:r>
-                      <a:rPr lang="en-US" b="0" i="1" smtClean="0">
-                        <a:latin typeface="Cambria Math" panose="02040503050406030204" pitchFamily="18" charset="0"/>
-                        <a:ea typeface="Cambria Math" panose="02040503050406030204" pitchFamily="18" charset="0"/>
-                      </a:rPr>
-                      <m:t>90%</m:t>
-                    </m:r>
-                  </m:oMath>
-                </a14:m>
-                <a:r>
-                  <a:rPr lang="en-US" dirty="0"/>
-                  <a:t>, 2024 </a:t>
-                </a:r>
-              </a:p>
-              <a:p>
-                <a:pPr lvl="1"/>
-                <a:r>
-                  <a:rPr lang="en-US" dirty="0"/>
-                  <a:t>Trade secrets make study of this subject difficult – cannot know details</a:t>
-                </a:r>
-              </a:p>
-              <a:p>
-                <a:pPr lvl="1"/>
-                <a:endParaRPr lang="en-US" dirty="0"/>
-              </a:p>
-            </p:txBody>
-          </p:sp>
-        </mc:Choice>
-        <mc:Fallback xmlns="">
-          <p:sp>
-            <p:nvSpPr>
-              <p:cNvPr id="3" name="Content Placeholder 2">
-                <a:extLst>
-                  <a:ext uri="{FF2B5EF4-FFF2-40B4-BE49-F238E27FC236}">
-                    <a16:creationId xmlns:a16="http://schemas.microsoft.com/office/drawing/2014/main" id="{D9C502E2-3889-41D4-9A2E-D8C04ADE5184}"/>
-                  </a:ext>
-                </a:extLst>
-              </p:cNvPr>
-              <p:cNvSpPr>
-                <a:spLocks noGrp="1" noRot="1" noChangeAspect="1" noMove="1" noResize="1" noEditPoints="1" noAdjustHandles="1" noChangeArrowheads="1" noChangeShapeType="1" noTextEdit="1"/>
-              </p:cNvSpPr>
-              <p:nvPr>
-                <p:ph idx="1"/>
-              </p:nvPr>
-            </p:nvSpPr>
-            <p:spPr>
-              <a:xfrm>
-                <a:off x="838200" y="1291525"/>
-                <a:ext cx="10515600" cy="5350779"/>
-              </a:xfrm>
-              <a:blipFill>
-                <a:blip r:embed="rId2"/>
-                <a:stretch>
-                  <a:fillRect l="-1043" t="-2278"/>
-                </a:stretch>
-              </a:blipFill>
-            </p:spPr>
-            <p:txBody>
-              <a:bodyPr/>
-              <a:lstStyle/>
-              <a:p>
-                <a:r>
-                  <a:rPr lang="en-US">
-                    <a:noFill/>
-                  </a:rPr>
-                  <a:t> </a:t>
-                </a:r>
-              </a:p>
-            </p:txBody>
-          </p:sp>
-        </mc:Fallback>
-      </mc:AlternateContent>
+      <p:sp>
+        <p:nvSpPr>
+          <p:cNvPr id="3" name="Content Placeholder 2">
+            <a:extLst>
+              <a:ext uri="{FF2B5EF4-FFF2-40B4-BE49-F238E27FC236}">
+                <a16:creationId xmlns:a16="http://schemas.microsoft.com/office/drawing/2014/main" id="{D9C502E2-3889-41D4-9A2E-D8C04ADE5184}"/>
+              </a:ext>
+            </a:extLst>
+          </p:cNvPr>
+          <p:cNvSpPr>
+            <a:spLocks noGrp="1"/>
+          </p:cNvSpPr>
+          <p:nvPr>
+            <p:ph idx="1"/>
+          </p:nvPr>
+        </p:nvSpPr>
+        <p:spPr>
+          <a:xfrm>
+            <a:off x="838200" y="1183037"/>
+            <a:ext cx="10515600" cy="5372745"/>
+          </a:xfrm>
+        </p:spPr>
+        <p:txBody>
+          <a:bodyPr>
+            <a:normAutofit/>
+          </a:bodyPr>
+          <a:lstStyle/>
+          <a:p>
+            <a:pPr marL="0" indent="0">
+              <a:buNone/>
+            </a:pPr>
+            <a:r>
+              <a:rPr lang="en-US" dirty="0"/>
+              <a:t>Web search is a subset of the general </a:t>
+            </a:r>
+            <a:r>
+              <a:rPr lang="en-US" b="1" dirty="0">
+                <a:hlinkClick r:id="rId2"/>
+              </a:rPr>
+              <a:t>information retrieval problem </a:t>
+            </a:r>
+            <a:endParaRPr lang="en-US" b="1" dirty="0"/>
+          </a:p>
+          <a:p>
+            <a:r>
+              <a:rPr lang="en-US" dirty="0"/>
+              <a:t>Search of documents, medical, legal, technical, etc. </a:t>
+            </a:r>
+          </a:p>
+          <a:p>
+            <a:r>
+              <a:rPr lang="en-US" b="1" dirty="0"/>
+              <a:t>Web search</a:t>
+            </a:r>
+          </a:p>
+          <a:p>
+            <a:r>
+              <a:rPr lang="en-US" b="1" dirty="0"/>
+              <a:t>Product similarity </a:t>
+            </a:r>
+            <a:r>
+              <a:rPr lang="en-US" dirty="0"/>
+              <a:t>for recommendations </a:t>
+            </a:r>
+          </a:p>
+          <a:p>
+            <a:r>
+              <a:rPr lang="en-US" dirty="0"/>
+              <a:t>Question and response systems</a:t>
+            </a:r>
+          </a:p>
+          <a:p>
+            <a:r>
+              <a:rPr lang="en-US" dirty="0"/>
+              <a:t>Retrieval augmented generation (RAG)</a:t>
+            </a:r>
+          </a:p>
+          <a:p>
+            <a:r>
+              <a:rPr lang="en-US" dirty="0"/>
+              <a:t>Conversational assistance</a:t>
+            </a:r>
+          </a:p>
+          <a:p>
+            <a:r>
+              <a:rPr lang="en-US" dirty="0"/>
+              <a:t>De-duplicate document databases</a:t>
+            </a:r>
+          </a:p>
+          <a:p>
+            <a:r>
+              <a:rPr lang="en-US" dirty="0"/>
+              <a:t>Genomics research  </a:t>
+            </a:r>
+          </a:p>
+          <a:p>
+            <a:r>
+              <a:rPr lang="en-US" dirty="0"/>
+              <a:t>Etc. </a:t>
+            </a:r>
+          </a:p>
+          <a:p>
+            <a:pPr lvl="1"/>
+            <a:endParaRPr lang="en-US" dirty="0"/>
+          </a:p>
+          <a:p>
+            <a:pPr lvl="1"/>
+            <a:endParaRPr lang="en-US" dirty="0"/>
+          </a:p>
+        </p:txBody>
+      </p:sp>
     </p:spTree>
     <p:extLst>
       <p:ext uri="{BB962C8B-B14F-4D97-AF65-F5344CB8AC3E}">
-        <p14:creationId xmlns:p14="http://schemas.microsoft.com/office/powerpoint/2010/main" val="1759693614"/>
+        <p14:creationId xmlns:p14="http://schemas.microsoft.com/office/powerpoint/2010/main" val="617719479"/>
       </p:ext>
     </p:extLst>
   </p:cSld>
@@ -18976,15 +19759,33 @@
                                   </p:childTnLst>
                                 </p:cTn>
                               </p:par>
+                            </p:childTnLst>
+                          </p:cTn>
+                        </p:par>
+                      </p:childTnLst>
+                    </p:cTn>
+                  </p:par>
+                  <p:par>
+                    <p:cTn id="7" fill="hold">
+                      <p:stCondLst>
+                        <p:cond delay="indefinite"/>
+                      </p:stCondLst>
+                      <p:childTnLst>
+                        <p:par>
+                          <p:cTn id="8" fill="hold">
+                            <p:stCondLst>
+                              <p:cond delay="0"/>
+                            </p:stCondLst>
+                            <p:childTnLst>
                               <p:par>
-                                <p:cTn id="7" presetID="1" presetClass="entr" presetSubtype="0" fill="hold" nodeType="withEffect">
+                                <p:cTn id="9" presetID="1" presetClass="entr" presetSubtype="0" fill="hold" nodeType="clickEffect">
                                   <p:stCondLst>
                                     <p:cond delay="0"/>
                                   </p:stCondLst>
                                   <p:childTnLst>
                                     <p:set>
                                       <p:cBhvr>
-                                        <p:cTn id="8" dur="1" fill="hold">
+                                        <p:cTn id="10" dur="1" fill="hold">
                                           <p:stCondLst>
                                             <p:cond delay="0"/>
                                           </p:stCondLst>
@@ -19007,15 +19808,33 @@
                                   </p:childTnLst>
                                 </p:cTn>
                               </p:par>
+                            </p:childTnLst>
+                          </p:cTn>
+                        </p:par>
+                      </p:childTnLst>
+                    </p:cTn>
+                  </p:par>
+                  <p:par>
+                    <p:cTn id="11" fill="hold">
+                      <p:stCondLst>
+                        <p:cond delay="indefinite"/>
+                      </p:stCondLst>
+                      <p:childTnLst>
+                        <p:par>
+                          <p:cTn id="12" fill="hold">
+                            <p:stCondLst>
+                              <p:cond delay="0"/>
+                            </p:stCondLst>
+                            <p:childTnLst>
                               <p:par>
-                                <p:cTn id="9" presetID="1" presetClass="entr" presetSubtype="0" fill="hold" nodeType="withEffect">
+                                <p:cTn id="13" presetID="1" presetClass="entr" presetSubtype="0" fill="hold" nodeType="clickEffect">
                                   <p:stCondLst>
                                     <p:cond delay="0"/>
                                   </p:stCondLst>
                                   <p:childTnLst>
                                     <p:set>
                                       <p:cBhvr>
-                                        <p:cTn id="10" dur="1" fill="hold">
+                                        <p:cTn id="14" dur="1" fill="hold">
                                           <p:stCondLst>
                                             <p:cond delay="0"/>
                                           </p:stCondLst>
@@ -19038,15 +19857,33 @@
                                   </p:childTnLst>
                                 </p:cTn>
                               </p:par>
+                            </p:childTnLst>
+                          </p:cTn>
+                        </p:par>
+                      </p:childTnLst>
+                    </p:cTn>
+                  </p:par>
+                  <p:par>
+                    <p:cTn id="15" fill="hold">
+                      <p:stCondLst>
+                        <p:cond delay="indefinite"/>
+                      </p:stCondLst>
+                      <p:childTnLst>
+                        <p:par>
+                          <p:cTn id="16" fill="hold">
+                            <p:stCondLst>
+                              <p:cond delay="0"/>
+                            </p:stCondLst>
+                            <p:childTnLst>
                               <p:par>
-                                <p:cTn id="11" presetID="1" presetClass="entr" presetSubtype="0" fill="hold" nodeType="withEffect">
+                                <p:cTn id="17" presetID="1" presetClass="entr" presetSubtype="0" fill="hold" nodeType="clickEffect">
                                   <p:stCondLst>
                                     <p:cond delay="0"/>
                                   </p:stCondLst>
                                   <p:childTnLst>
                                     <p:set>
                                       <p:cBhvr>
-                                        <p:cTn id="12" dur="1" fill="hold">
+                                        <p:cTn id="18" dur="1" fill="hold">
                                           <p:stCondLst>
                                             <p:cond delay="0"/>
                                           </p:stCondLst>
@@ -19076,26 +19913,26 @@
                     </p:cTn>
                   </p:par>
                   <p:par>
-                    <p:cTn id="13" fill="hold">
+                    <p:cTn id="19" fill="hold">
                       <p:stCondLst>
                         <p:cond delay="indefinite"/>
                       </p:stCondLst>
                       <p:childTnLst>
                         <p:par>
-                          <p:cTn id="14" fill="hold">
+                          <p:cTn id="20" fill="hold">
                             <p:stCondLst>
                               <p:cond delay="0"/>
                             </p:stCondLst>
                             <p:childTnLst>
                               <p:par>
-                                <p:cTn id="15" presetID="1" presetClass="entr" presetSubtype="0" fill="hold" nodeType="clickEffect">
+                                <p:cTn id="21" presetID="1" presetClass="entr" presetSubtype="0" fill="hold" nodeType="clickEffect">
                                   <p:stCondLst>
                                     <p:cond delay="0"/>
                                   </p:stCondLst>
                                   <p:childTnLst>
                                     <p:set>
                                       <p:cBhvr>
-                                        <p:cTn id="16" dur="1" fill="hold">
+                                        <p:cTn id="22" dur="1" fill="hold">
                                           <p:stCondLst>
                                             <p:cond delay="0"/>
                                           </p:stCondLst>
@@ -19118,132 +19955,26 @@
                                   </p:childTnLst>
                                 </p:cTn>
                               </p:par>
+                            </p:childTnLst>
+                          </p:cTn>
+                        </p:par>
+                      </p:childTnLst>
+                    </p:cTn>
+                  </p:par>
+                  <p:par>
+                    <p:cTn id="23" fill="hold">
+                      <p:stCondLst>
+                        <p:cond delay="indefinite"/>
+                      </p:stCondLst>
+                      <p:childTnLst>
+                        <p:par>
+                          <p:cTn id="24" fill="hold">
+                            <p:stCondLst>
+                              <p:cond delay="0"/>
+                            </p:stCondLst>
+                            <p:childTnLst>
                               <p:par>
-                                <p:cTn id="17" presetID="1" presetClass="entr" presetSubtype="0" fill="hold" nodeType="withEffect">
-                                  <p:stCondLst>
-                                    <p:cond delay="0"/>
-                                  </p:stCondLst>
-                                  <p:childTnLst>
-                                    <p:set>
-                                      <p:cBhvr>
-                                        <p:cTn id="18" dur="1" fill="hold">
-                                          <p:stCondLst>
-                                            <p:cond delay="0"/>
-                                          </p:stCondLst>
-                                        </p:cTn>
-                                        <p:tgtEl>
-                                          <p:spTgt spid="3">
-                                            <p:txEl>
-                                              <p:pRg st="6" end="6"/>
-                                            </p:txEl>
-                                          </p:spTgt>
-                                        </p:tgtEl>
-                                        <p:attrNameLst>
-                                          <p:attrName>style.visibility</p:attrName>
-                                        </p:attrNameLst>
-                                      </p:cBhvr>
-                                      <p:to>
-                                        <p:strVal val="visible"/>
-                                      </p:to>
-                                    </p:set>
-                                  </p:childTnLst>
-                                </p:cTn>
-                              </p:par>
-                              <p:par>
-                                <p:cTn id="19" presetID="1" presetClass="entr" presetSubtype="0" fill="hold" nodeType="withEffect">
-                                  <p:stCondLst>
-                                    <p:cond delay="0"/>
-                                  </p:stCondLst>
-                                  <p:childTnLst>
-                                    <p:set>
-                                      <p:cBhvr>
-                                        <p:cTn id="20" dur="1" fill="hold">
-                                          <p:stCondLst>
-                                            <p:cond delay="0"/>
-                                          </p:stCondLst>
-                                        </p:cTn>
-                                        <p:tgtEl>
-                                          <p:spTgt spid="3">
-                                            <p:txEl>
-                                              <p:pRg st="7" end="7"/>
-                                            </p:txEl>
-                                          </p:spTgt>
-                                        </p:tgtEl>
-                                        <p:attrNameLst>
-                                          <p:attrName>style.visibility</p:attrName>
-                                        </p:attrNameLst>
-                                      </p:cBhvr>
-                                      <p:to>
-                                        <p:strVal val="visible"/>
-                                      </p:to>
-                                    </p:set>
-                                  </p:childTnLst>
-                                </p:cTn>
-                              </p:par>
-                              <p:par>
-                                <p:cTn id="21" presetID="1" presetClass="entr" presetSubtype="0" fill="hold" nodeType="withEffect">
-                                  <p:stCondLst>
-                                    <p:cond delay="0"/>
-                                  </p:stCondLst>
-                                  <p:childTnLst>
-                                    <p:set>
-                                      <p:cBhvr>
-                                        <p:cTn id="22" dur="1" fill="hold">
-                                          <p:stCondLst>
-                                            <p:cond delay="0"/>
-                                          </p:stCondLst>
-                                        </p:cTn>
-                                        <p:tgtEl>
-                                          <p:spTgt spid="3">
-                                            <p:txEl>
-                                              <p:pRg st="8" end="8"/>
-                                            </p:txEl>
-                                          </p:spTgt>
-                                        </p:tgtEl>
-                                        <p:attrNameLst>
-                                          <p:attrName>style.visibility</p:attrName>
-                                        </p:attrNameLst>
-                                      </p:cBhvr>
-                                      <p:to>
-                                        <p:strVal val="visible"/>
-                                      </p:to>
-                                    </p:set>
-                                  </p:childTnLst>
-                                </p:cTn>
-                              </p:par>
-                              <p:par>
-                                <p:cTn id="23" presetID="1" presetClass="entr" presetSubtype="0" fill="hold" nodeType="withEffect">
-                                  <p:stCondLst>
-                                    <p:cond delay="0"/>
-                                  </p:stCondLst>
-                                  <p:childTnLst>
-                                    <p:set>
-                                      <p:cBhvr>
-                                        <p:cTn id="24" dur="1" fill="hold">
-                                          <p:stCondLst>
-                                            <p:cond delay="0"/>
-                                          </p:stCondLst>
-                                        </p:cTn>
-                                        <p:tgtEl>
-                                          <p:spTgt spid="3">
-                                            <p:txEl>
-                                              <p:pRg st="9" end="9"/>
-                                            </p:txEl>
-                                          </p:spTgt>
-                                        </p:tgtEl>
-                                        <p:attrNameLst>
-                                          <p:attrName>style.visibility</p:attrName>
-                                        </p:attrNameLst>
-                                      </p:cBhvr>
-                                      <p:to>
-                                        <p:strVal val="visible"/>
-                                      </p:to>
-                                    </p:set>
-                                  </p:childTnLst>
-                                </p:cTn>
-                              </p:par>
-                              <p:par>
-                                <p:cTn id="25" presetID="1" presetClass="entr" presetSubtype="0" fill="hold" nodeType="withEffect">
+                                <p:cTn id="25" presetID="1" presetClass="entr" presetSubtype="0" fill="hold" nodeType="clickEffect">
                                   <p:stCondLst>
                                     <p:cond delay="0"/>
                                   </p:stCondLst>
@@ -19258,7 +19989,7 @@
                                         <p:tgtEl>
                                           <p:spTgt spid="3">
                                             <p:txEl>
-                                              <p:pRg st="10" end="10"/>
+                                              <p:pRg st="6" end="6"/>
                                             </p:txEl>
                                           </p:spTgt>
                                         </p:tgtEl>
@@ -19307,7 +20038,7 @@
                                         <p:tgtEl>
                                           <p:spTgt spid="3">
                                             <p:txEl>
-                                              <p:pRg st="11" end="11"/>
+                                              <p:pRg st="7" end="7"/>
                                             </p:txEl>
                                           </p:spTgt>
                                         </p:tgtEl>
@@ -19322,15 +20053,33 @@
                                   </p:childTnLst>
                                 </p:cTn>
                               </p:par>
+                            </p:childTnLst>
+                          </p:cTn>
+                        </p:par>
+                      </p:childTnLst>
+                    </p:cTn>
+                  </p:par>
+                  <p:par>
+                    <p:cTn id="31" fill="hold">
+                      <p:stCondLst>
+                        <p:cond delay="indefinite"/>
+                      </p:stCondLst>
+                      <p:childTnLst>
+                        <p:par>
+                          <p:cTn id="32" fill="hold">
+                            <p:stCondLst>
+                              <p:cond delay="0"/>
+                            </p:stCondLst>
+                            <p:childTnLst>
                               <p:par>
-                                <p:cTn id="31" presetID="1" presetClass="entr" presetSubtype="0" fill="hold" nodeType="withEffect">
+                                <p:cTn id="33" presetID="1" presetClass="entr" presetSubtype="0" fill="hold" nodeType="clickEffect">
                                   <p:stCondLst>
                                     <p:cond delay="0"/>
                                   </p:stCondLst>
                                   <p:childTnLst>
                                     <p:set>
                                       <p:cBhvr>
-                                        <p:cTn id="32" dur="1" fill="hold">
+                                        <p:cTn id="34" dur="1" fill="hold">
                                           <p:stCondLst>
                                             <p:cond delay="0"/>
                                           </p:stCondLst>
@@ -19338,7 +20087,7 @@
                                         <p:tgtEl>
                                           <p:spTgt spid="3">
                                             <p:txEl>
-                                              <p:pRg st="12" end="12"/>
+                                              <p:pRg st="8" end="8"/>
                                             </p:txEl>
                                           </p:spTgt>
                                         </p:tgtEl>
@@ -19353,15 +20102,33 @@
                                   </p:childTnLst>
                                 </p:cTn>
                               </p:par>
+                            </p:childTnLst>
+                          </p:cTn>
+                        </p:par>
+                      </p:childTnLst>
+                    </p:cTn>
+                  </p:par>
+                  <p:par>
+                    <p:cTn id="35" fill="hold">
+                      <p:stCondLst>
+                        <p:cond delay="indefinite"/>
+                      </p:stCondLst>
+                      <p:childTnLst>
+                        <p:par>
+                          <p:cTn id="36" fill="hold">
+                            <p:stCondLst>
+                              <p:cond delay="0"/>
+                            </p:stCondLst>
+                            <p:childTnLst>
                               <p:par>
-                                <p:cTn id="33" presetID="1" presetClass="entr" presetSubtype="0" fill="hold" nodeType="withEffect">
+                                <p:cTn id="37" presetID="1" presetClass="entr" presetSubtype="0" fill="hold" nodeType="clickEffect">
                                   <p:stCondLst>
                                     <p:cond delay="0"/>
                                   </p:stCondLst>
                                   <p:childTnLst>
                                     <p:set>
                                       <p:cBhvr>
-                                        <p:cTn id="34" dur="1" fill="hold">
+                                        <p:cTn id="38" dur="1" fill="hold">
                                           <p:stCondLst>
                                             <p:cond delay="0"/>
                                           </p:stCondLst>
@@ -19369,7 +20136,7 @@
                                         <p:tgtEl>
                                           <p:spTgt spid="3">
                                             <p:txEl>
-                                              <p:pRg st="13" end="13"/>
+                                              <p:pRg st="9" end="9"/>
                                             </p:txEl>
                                           </p:spTgt>
                                         </p:tgtEl>
@@ -26919,13 +27686,7 @@
   <p:cSld>
     <p:spTree>
       <p:nvGrpSpPr>
-        <p:cNvPr id="1" name="">
-          <a:extLst>
-            <a:ext uri="{FF2B5EF4-FFF2-40B4-BE49-F238E27FC236}">
-              <a16:creationId xmlns:a16="http://schemas.microsoft.com/office/drawing/2014/main" id="{A49C904F-6B0E-2277-CFBE-978784BFE255}"/>
-            </a:ext>
-          </a:extLst>
-        </p:cNvPr>
+        <p:cNvPr id="1" name=""/>
         <p:cNvGrpSpPr/>
         <p:nvPr/>
       </p:nvGrpSpPr>
@@ -26942,7 +27703,7 @@
           <p:cNvPr id="2" name="Title 1">
             <a:extLst>
               <a:ext uri="{FF2B5EF4-FFF2-40B4-BE49-F238E27FC236}">
-                <a16:creationId xmlns:a16="http://schemas.microsoft.com/office/drawing/2014/main" id="{9427E589-5BDE-6699-F9F3-FF57CACBCDAC}"/>
+                <a16:creationId xmlns:a16="http://schemas.microsoft.com/office/drawing/2014/main" id="{4702757D-9716-4C25-BA54-81C26D6EC04E}"/>
               </a:ext>
             </a:extLst>
           </p:cNvPr>
@@ -26974,207 +27735,221 @@
           </a:p>
         </p:txBody>
       </p:sp>
-      <p:sp>
-        <p:nvSpPr>
-          <p:cNvPr id="3" name="Content Placeholder 2">
-            <a:extLst>
-              <a:ext uri="{FF2B5EF4-FFF2-40B4-BE49-F238E27FC236}">
-                <a16:creationId xmlns:a16="http://schemas.microsoft.com/office/drawing/2014/main" id="{4BC69A5A-4E55-96BE-1039-71C8305C3B04}"/>
-              </a:ext>
-            </a:extLst>
-          </p:cNvPr>
-          <p:cNvSpPr>
-            <a:spLocks noGrp="1"/>
-          </p:cNvSpPr>
-          <p:nvPr>
-            <p:ph idx="1"/>
-          </p:nvPr>
-        </p:nvSpPr>
-        <p:spPr>
-          <a:xfrm>
-            <a:off x="838200" y="1183037"/>
-            <a:ext cx="10515600" cy="5372745"/>
-          </a:xfrm>
-        </p:spPr>
-        <p:txBody>
-          <a:bodyPr>
-            <a:normAutofit/>
-          </a:bodyPr>
-          <a:lstStyle/>
-          <a:p>
-            <a:pPr marL="0" indent="0">
-              <a:buNone/>
-            </a:pPr>
-            <a:r>
-              <a:rPr lang="en-US" dirty="0"/>
-              <a:t>Many pitfalls in web search</a:t>
-            </a:r>
-          </a:p>
-          <a:p>
-            <a:r>
-              <a:rPr lang="en-US" dirty="0"/>
-              <a:t>Limited length query may not incorporate semantics and context</a:t>
-            </a:r>
-          </a:p>
-          <a:p>
-            <a:r>
-              <a:rPr lang="en-US" dirty="0"/>
-              <a:t>Natural language used for query is often ambiguous </a:t>
-            </a:r>
-          </a:p>
-          <a:p>
-            <a:pPr lvl="1"/>
-            <a:r>
-              <a:rPr lang="en-US" dirty="0"/>
-              <a:t>Example: Query for ‘</a:t>
-            </a:r>
-            <a:r>
-              <a:rPr lang="en-US" i="1" dirty="0"/>
-              <a:t>Jaguar numbers</a:t>
-            </a:r>
-            <a:r>
-              <a:rPr lang="en-US" dirty="0"/>
-              <a:t>’ could refer to an endangered large cat, an automobile, a sports team, or maybe something else??</a:t>
-            </a:r>
-          </a:p>
-          <a:p>
-            <a:r>
-              <a:rPr lang="en-US" dirty="0"/>
-              <a:t>Keywords are not unique to a topic</a:t>
-            </a:r>
-          </a:p>
-          <a:p>
-            <a:pPr lvl="1"/>
-            <a:r>
-              <a:rPr lang="en-US" dirty="0"/>
-              <a:t>Example: ‘</a:t>
-            </a:r>
-            <a:r>
-              <a:rPr lang="en-US" i="1" dirty="0"/>
-              <a:t>Ban</a:t>
-            </a:r>
-            <a:r>
-              <a:rPr lang="en-US" dirty="0"/>
-              <a:t>k’ can refer to a </a:t>
-            </a:r>
-            <a:r>
-              <a:rPr lang="en-US" i="1" dirty="0"/>
-              <a:t>financial institution</a:t>
-            </a:r>
-            <a:r>
-              <a:rPr lang="en-US" dirty="0"/>
-              <a:t>, the </a:t>
-            </a:r>
-            <a:r>
-              <a:rPr lang="en-US" i="1" dirty="0"/>
-              <a:t>edge of river</a:t>
-            </a:r>
-            <a:r>
-              <a:rPr lang="en-US" dirty="0"/>
-              <a:t>, or the </a:t>
-            </a:r>
-            <a:r>
-              <a:rPr lang="en-US" i="1" dirty="0"/>
-              <a:t>an aircraft maneuver, …  </a:t>
-            </a:r>
-          </a:p>
-          <a:p>
-            <a:r>
-              <a:rPr lang="en-US" dirty="0"/>
-              <a:t>Keywords have synonyms</a:t>
-            </a:r>
-          </a:p>
-          <a:p>
-            <a:pPr lvl="1"/>
-            <a:r>
-              <a:rPr lang="en-US" dirty="0"/>
-              <a:t>Example of two queries with different key words but identical </a:t>
-            </a:r>
-            <a:r>
-              <a:rPr lang="en-US" dirty="0" err="1"/>
-              <a:t>symantics</a:t>
-            </a:r>
-            <a:r>
-              <a:rPr lang="en-US" dirty="0"/>
-              <a:t> </a:t>
-            </a:r>
-          </a:p>
-          <a:p>
-            <a:pPr marL="457200" lvl="1" indent="0" algn="ctr">
-              <a:buNone/>
-            </a:pPr>
-            <a:r>
-              <a:rPr lang="en-US" dirty="0"/>
-              <a:t>“</a:t>
-            </a:r>
-            <a:r>
-              <a:rPr lang="en-US" i="1" dirty="0"/>
-              <a:t>What has been the loss of </a:t>
-            </a:r>
-            <a:r>
-              <a:rPr lang="en-US" b="1" i="1" dirty="0">
-                <a:solidFill>
-                  <a:srgbClr val="C00000"/>
-                </a:solidFill>
-              </a:rPr>
-              <a:t>farm land </a:t>
-            </a:r>
-            <a:r>
-              <a:rPr lang="en-US" i="1" dirty="0"/>
-              <a:t>in the US in 2024</a:t>
-            </a:r>
-            <a:r>
-              <a:rPr lang="en-US" dirty="0"/>
-              <a:t>”    </a:t>
-            </a:r>
-          </a:p>
-          <a:p>
-            <a:pPr marL="457200" lvl="1" indent="0" algn="ctr">
-              <a:buNone/>
-            </a:pPr>
-            <a:r>
-              <a:rPr lang="en-US" dirty="0"/>
-              <a:t>“</a:t>
-            </a:r>
-            <a:r>
-              <a:rPr lang="en-US" i="1" dirty="0"/>
-              <a:t>How many </a:t>
-            </a:r>
-            <a:r>
-              <a:rPr lang="en-US" b="1" i="1" dirty="0">
-                <a:solidFill>
-                  <a:srgbClr val="C00000"/>
-                </a:solidFill>
-              </a:rPr>
-              <a:t>cultivated acers </a:t>
-            </a:r>
-            <a:r>
-              <a:rPr lang="en-US" i="1" dirty="0"/>
-              <a:t>were lost in the US </a:t>
-            </a:r>
-            <a:r>
-              <a:rPr lang="en-US" i="1" dirty="0" err="1"/>
-              <a:t>durring</a:t>
-            </a:r>
-            <a:r>
-              <a:rPr lang="en-US" i="1" dirty="0"/>
-              <a:t> 2024</a:t>
-            </a:r>
-            <a:r>
-              <a:rPr lang="en-US" dirty="0"/>
-              <a:t>”</a:t>
-            </a:r>
-          </a:p>
-          <a:p>
-            <a:pPr lvl="1"/>
-            <a:endParaRPr lang="en-US" dirty="0"/>
-          </a:p>
-        </p:txBody>
-      </p:sp>
+      <mc:AlternateContent xmlns:mc="http://schemas.openxmlformats.org/markup-compatibility/2006" xmlns:a14="http://schemas.microsoft.com/office/drawing/2010/main">
+        <mc:Choice Requires="a14">
+          <p:sp>
+            <p:nvSpPr>
+              <p:cNvPr id="3" name="Content Placeholder 2">
+                <a:extLst>
+                  <a:ext uri="{FF2B5EF4-FFF2-40B4-BE49-F238E27FC236}">
+                    <a16:creationId xmlns:a16="http://schemas.microsoft.com/office/drawing/2014/main" id="{D9C502E2-3889-41D4-9A2E-D8C04ADE5184}"/>
+                  </a:ext>
+                </a:extLst>
+              </p:cNvPr>
+              <p:cNvSpPr>
+                <a:spLocks noGrp="1"/>
+              </p:cNvSpPr>
+              <p:nvPr>
+                <p:ph idx="1"/>
+              </p:nvPr>
+            </p:nvSpPr>
+            <p:spPr>
+              <a:xfrm>
+                <a:off x="838200" y="1291525"/>
+                <a:ext cx="10515600" cy="5350779"/>
+              </a:xfrm>
+            </p:spPr>
+            <p:txBody>
+              <a:bodyPr>
+                <a:normAutofit fontScale="92500" lnSpcReduction="10000"/>
+              </a:bodyPr>
+              <a:lstStyle/>
+              <a:p>
+                <a:pPr marL="0" indent="0">
+                  <a:buNone/>
+                </a:pPr>
+                <a:r>
+                  <a:rPr lang="en-US" b="1" dirty="0"/>
+                  <a:t>Web search </a:t>
+                </a:r>
+                <a:r>
+                  <a:rPr lang="en-US" dirty="0"/>
+                  <a:t>is undoubtedly the most widely used data mining application</a:t>
+                </a:r>
+                <a:endParaRPr lang="en-US" b="1" dirty="0"/>
+              </a:p>
+              <a:p>
+                <a:r>
+                  <a:rPr lang="en-US" dirty="0"/>
+                  <a:t>Major search engines, like Google, Bing, Yahoo!, Baidu are complex</a:t>
+                </a:r>
+              </a:p>
+              <a:p>
+                <a:pPr lvl="1"/>
+                <a:r>
+                  <a:rPr lang="en-US" dirty="0"/>
+                  <a:t>Employ multiple algorithms </a:t>
+                </a:r>
+              </a:p>
+              <a:p>
+                <a:pPr lvl="1"/>
+                <a:r>
+                  <a:rPr lang="en-US" dirty="0"/>
+                  <a:t>Based on page content and hyperlinks</a:t>
+                </a:r>
+              </a:p>
+              <a:p>
+                <a:pPr lvl="1"/>
+                <a:r>
+                  <a:rPr lang="en-US" dirty="0"/>
+                  <a:t>Typically use other information – e.g. user profiles and history</a:t>
+                </a:r>
+              </a:p>
+              <a:p>
+                <a:r>
+                  <a:rPr lang="en-US" dirty="0"/>
+                  <a:t>Complexity arises from:</a:t>
+                </a:r>
+              </a:p>
+              <a:p>
+                <a:pPr lvl="1"/>
+                <a:r>
+                  <a:rPr lang="en-US" dirty="0"/>
+                  <a:t>Massive data volumes </a:t>
+                </a:r>
+              </a:p>
+              <a:p>
+                <a:pPr lvl="1"/>
+                <a:r>
+                  <a:rPr lang="en-US" dirty="0"/>
+                  <a:t>Unlimited number of possible queries - can’t really know user intent</a:t>
+                </a:r>
+              </a:p>
+              <a:p>
+                <a:pPr lvl="1"/>
+                <a:r>
+                  <a:rPr lang="en-US" dirty="0"/>
+                  <a:t>Pages in many formats, text, images, videos, documents, etc. </a:t>
+                </a:r>
+              </a:p>
+              <a:p>
+                <a:pPr lvl="1"/>
+                <a:r>
+                  <a:rPr lang="en-US" dirty="0"/>
+                  <a:t>Web spam</a:t>
+                </a:r>
+              </a:p>
+              <a:p>
+                <a:pPr lvl="1"/>
+                <a:r>
+                  <a:rPr lang="en-US" dirty="0"/>
+                  <a:t>Enormous number of topics</a:t>
+                </a:r>
+              </a:p>
+              <a:p>
+                <a:r>
+                  <a:rPr lang="en-US" dirty="0"/>
+                  <a:t>Small number of large companies dominate search   </a:t>
+                </a:r>
+              </a:p>
+              <a:p>
+                <a:pPr lvl="1"/>
+                <a:r>
+                  <a:rPr lang="en-US" dirty="0"/>
+                  <a:t>Google’s US market share </a:t>
+                </a:r>
+                <a14:m>
+                  <m:oMath xmlns:m="http://schemas.openxmlformats.org/officeDocument/2006/math">
+                    <m:r>
+                      <a:rPr lang="en-US" i="1" smtClean="0">
+                        <a:latin typeface="Cambria Math" panose="02040503050406030204" pitchFamily="18" charset="0"/>
+                        <a:ea typeface="Cambria Math" panose="02040503050406030204" pitchFamily="18" charset="0"/>
+                      </a:rPr>
+                      <m:t>~</m:t>
+                    </m:r>
+                    <m:r>
+                      <a:rPr lang="en-US" b="0" i="1" smtClean="0">
+                        <a:latin typeface="Cambria Math" panose="02040503050406030204" pitchFamily="18" charset="0"/>
+                        <a:ea typeface="Cambria Math" panose="02040503050406030204" pitchFamily="18" charset="0"/>
+                      </a:rPr>
+                      <m:t>90</m:t>
+                    </m:r>
+                    <m:r>
+                      <a:rPr lang="en-US" b="0" i="1" smtClean="0">
+                        <a:latin typeface="Cambria Math" panose="02040503050406030204" pitchFamily="18" charset="0"/>
+                        <a:ea typeface="Cambria Math" panose="02040503050406030204" pitchFamily="18" charset="0"/>
+                      </a:rPr>
+                      <m:t>%</m:t>
+                    </m:r>
+                  </m:oMath>
+                </a14:m>
+                <a:r>
+                  <a:rPr lang="en-US" dirty="0"/>
+                  <a:t>, 2024 </a:t>
+                </a:r>
+              </a:p>
+              <a:p>
+                <a:pPr lvl="1"/>
+                <a:r>
+                  <a:rPr lang="en-US" dirty="0"/>
+                  <a:t>Trade secrets make study of this subject difficult – cannot know details</a:t>
+                </a:r>
+              </a:p>
+              <a:p>
+                <a:pPr lvl="1"/>
+                <a:endParaRPr lang="en-US" dirty="0"/>
+              </a:p>
+            </p:txBody>
+          </p:sp>
+        </mc:Choice>
+        <mc:Fallback xmlns="">
+          <p:sp>
+            <p:nvSpPr>
+              <p:cNvPr id="3" name="Content Placeholder 2">
+                <a:extLst>
+                  <a:ext uri="{FF2B5EF4-FFF2-40B4-BE49-F238E27FC236}">
+                    <a16:creationId xmlns:a16="http://schemas.microsoft.com/office/drawing/2014/main" id="{D9C502E2-3889-41D4-9A2E-D8C04ADE5184}"/>
+                  </a:ext>
+                </a:extLst>
+              </p:cNvPr>
+              <p:cNvSpPr>
+                <a:spLocks noGrp="1" noRot="1" noChangeAspect="1" noMove="1" noResize="1" noEditPoints="1" noAdjustHandles="1" noChangeArrowheads="1" noChangeShapeType="1" noTextEdit="1"/>
+              </p:cNvSpPr>
+              <p:nvPr>
+                <p:ph idx="1"/>
+              </p:nvPr>
+            </p:nvSpPr>
+            <p:spPr>
+              <a:xfrm>
+                <a:off x="838200" y="1291525"/>
+                <a:ext cx="10515600" cy="5350779"/>
+              </a:xfrm>
+              <a:blipFill>
+                <a:blip r:embed="rId2"/>
+                <a:stretch>
+                  <a:fillRect l="-1043" t="-2278"/>
+                </a:stretch>
+              </a:blipFill>
+            </p:spPr>
+            <p:txBody>
+              <a:bodyPr/>
+              <a:lstStyle/>
+              <a:p>
+                <a:r>
+                  <a:rPr lang="en-US">
+                    <a:noFill/>
+                  </a:rPr>
+                  <a:t> </a:t>
+                </a:r>
+              </a:p>
+            </p:txBody>
+          </p:sp>
+        </mc:Fallback>
+      </mc:AlternateContent>
     </p:spTree>
     <p:extLst>
       <p:ext uri="{BB962C8B-B14F-4D97-AF65-F5344CB8AC3E}">
-        <p14:creationId xmlns:p14="http://schemas.microsoft.com/office/powerpoint/2010/main" val="643151138"/>
+        <p14:creationId xmlns:p14="http://schemas.microsoft.com/office/powerpoint/2010/main" val="1759693614"/>
       </p:ext>
     </p:extLst>
   </p:cSld>
@@ -27232,26 +28007,39 @@
                                   </p:childTnLst>
                                 </p:cTn>
                               </p:par>
-                            </p:childTnLst>
-                          </p:cTn>
-                        </p:par>
-                      </p:childTnLst>
-                    </p:cTn>
-                  </p:par>
-                  <p:par>
-                    <p:cTn id="7" fill="hold">
-                      <p:stCondLst>
-                        <p:cond delay="indefinite"/>
-                      </p:stCondLst>
-                      <p:childTnLst>
-                        <p:par>
-                          <p:cTn id="8" fill="hold">
-                            <p:stCondLst>
-                              <p:cond delay="0"/>
-                            </p:stCondLst>
-                            <p:childTnLst>
                               <p:par>
-                                <p:cTn id="9" presetID="1" presetClass="entr" presetSubtype="0" fill="hold" nodeType="clickEffect">
+                                <p:cTn id="7" presetID="1" presetClass="entr" presetSubtype="0" fill="hold" nodeType="withEffect">
+                                  <p:stCondLst>
+                                    <p:cond delay="0"/>
+                                  </p:stCondLst>
+                                  <p:childTnLst>
+                                    <p:set>
+                                      <p:cBhvr>
+                                        <p:cTn id="8" dur="1" fill="hold">
+                                          <p:stCondLst>
+                                            <p:cond delay="0"/>
+                                          </p:stCondLst>
+                                        </p:cTn>
+                                        <p:tgtEl>
+                                          <p:spTgt spid="3">
+                                            <p:txEl>
+                                              <p:pRg st="2" end="2"/>
+                                            </p:txEl>
+                                          </p:spTgt>
+                                        </p:tgtEl>
+                                        <p:attrNameLst>
+                                          <p:attrName>style.visibility</p:attrName>
+                                        </p:attrNameLst>
+                                      </p:cBhvr>
+                                      <p:to>
+                                        <p:strVal val="visible"/>
+                                      </p:to>
+                                    </p:set>
+                                  </p:childTnLst>
+                                </p:cTn>
+                              </p:par>
+                              <p:par>
+                                <p:cTn id="9" presetID="1" presetClass="entr" presetSubtype="0" fill="hold" nodeType="withEffect">
                                   <p:stCondLst>
                                     <p:cond delay="0"/>
                                   </p:stCondLst>
@@ -27266,7 +28054,7 @@
                                         <p:tgtEl>
                                           <p:spTgt spid="3">
                                             <p:txEl>
-                                              <p:pRg st="2" end="2"/>
+                                              <p:pRg st="3" end="3"/>
                                             </p:txEl>
                                           </p:spTgt>
                                         </p:tgtEl>
@@ -27297,7 +28085,7 @@
                                         <p:tgtEl>
                                           <p:spTgt spid="3">
                                             <p:txEl>
-                                              <p:pRg st="3" end="3"/>
+                                              <p:pRg st="4" end="4"/>
                                             </p:txEl>
                                           </p:spTgt>
                                         </p:tgtEl>
@@ -27346,7 +28134,7 @@
                                         <p:tgtEl>
                                           <p:spTgt spid="3">
                                             <p:txEl>
-                                              <p:pRg st="4" end="4"/>
+                                              <p:pRg st="5" end="5"/>
                                             </p:txEl>
                                           </p:spTgt>
                                         </p:tgtEl>
@@ -27377,7 +28165,7 @@
                                         <p:tgtEl>
                                           <p:spTgt spid="3">
                                             <p:txEl>
-                                              <p:pRg st="5" end="5"/>
+                                              <p:pRg st="6" end="6"/>
                                             </p:txEl>
                                           </p:spTgt>
                                         </p:tgtEl>
@@ -27392,26 +28180,39 @@
                                   </p:childTnLst>
                                 </p:cTn>
                               </p:par>
-                            </p:childTnLst>
-                          </p:cTn>
-                        </p:par>
-                      </p:childTnLst>
-                    </p:cTn>
-                  </p:par>
-                  <p:par>
-                    <p:cTn id="19" fill="hold">
-                      <p:stCondLst>
-                        <p:cond delay="indefinite"/>
-                      </p:stCondLst>
-                      <p:childTnLst>
-                        <p:par>
-                          <p:cTn id="20" fill="hold">
-                            <p:stCondLst>
-                              <p:cond delay="0"/>
-                            </p:stCondLst>
-                            <p:childTnLst>
                               <p:par>
-                                <p:cTn id="21" presetID="1" presetClass="entr" presetSubtype="0" fill="hold" nodeType="clickEffect">
+                                <p:cTn id="19" presetID="1" presetClass="entr" presetSubtype="0" fill="hold" nodeType="withEffect">
+                                  <p:stCondLst>
+                                    <p:cond delay="0"/>
+                                  </p:stCondLst>
+                                  <p:childTnLst>
+                                    <p:set>
+                                      <p:cBhvr>
+                                        <p:cTn id="20" dur="1" fill="hold">
+                                          <p:stCondLst>
+                                            <p:cond delay="0"/>
+                                          </p:stCondLst>
+                                        </p:cTn>
+                                        <p:tgtEl>
+                                          <p:spTgt spid="3">
+                                            <p:txEl>
+                                              <p:pRg st="7" end="7"/>
+                                            </p:txEl>
+                                          </p:spTgt>
+                                        </p:tgtEl>
+                                        <p:attrNameLst>
+                                          <p:attrName>style.visibility</p:attrName>
+                                        </p:attrNameLst>
+                                      </p:cBhvr>
+                                      <p:to>
+                                        <p:strVal val="visible"/>
+                                      </p:to>
+                                    </p:set>
+                                  </p:childTnLst>
+                                </p:cTn>
+                              </p:par>
+                              <p:par>
+                                <p:cTn id="21" presetID="1" presetClass="entr" presetSubtype="0" fill="hold" nodeType="withEffect">
                                   <p:stCondLst>
                                     <p:cond delay="0"/>
                                   </p:stCondLst>
@@ -27426,7 +28227,7 @@
                                         <p:tgtEl>
                                           <p:spTgt spid="3">
                                             <p:txEl>
-                                              <p:pRg st="6" end="6"/>
+                                              <p:pRg st="8" end="8"/>
                                             </p:txEl>
                                           </p:spTgt>
                                         </p:tgtEl>
@@ -27457,7 +28258,7 @@
                                         <p:tgtEl>
                                           <p:spTgt spid="3">
                                             <p:txEl>
-                                              <p:pRg st="7" end="7"/>
+                                              <p:pRg st="9" end="9"/>
                                             </p:txEl>
                                           </p:spTgt>
                                         </p:tgtEl>
@@ -27488,7 +28289,56 @@
                                         <p:tgtEl>
                                           <p:spTgt spid="3">
                                             <p:txEl>
-                                              <p:pRg st="8" end="8"/>
+                                              <p:pRg st="10" end="10"/>
+                                            </p:txEl>
+                                          </p:spTgt>
+                                        </p:tgtEl>
+                                        <p:attrNameLst>
+                                          <p:attrName>style.visibility</p:attrName>
+                                        </p:attrNameLst>
+                                      </p:cBhvr>
+                                      <p:to>
+                                        <p:strVal val="visible"/>
+                                      </p:to>
+                                    </p:set>
+                                  </p:childTnLst>
+                                </p:cTn>
+                              </p:par>
+                            </p:childTnLst>
+                          </p:cTn>
+                        </p:par>
+                      </p:childTnLst>
+                    </p:cTn>
+                  </p:par>
+                  <p:par>
+                    <p:cTn id="27" fill="hold">
+                      <p:stCondLst>
+                        <p:cond delay="indefinite"/>
+                      </p:stCondLst>
+                      <p:childTnLst>
+                        <p:par>
+                          <p:cTn id="28" fill="hold">
+                            <p:stCondLst>
+                              <p:cond delay="0"/>
+                            </p:stCondLst>
+                            <p:childTnLst>
+                              <p:par>
+                                <p:cTn id="29" presetID="1" presetClass="entr" presetSubtype="0" fill="hold" nodeType="clickEffect">
+                                  <p:stCondLst>
+                                    <p:cond delay="0"/>
+                                  </p:stCondLst>
+                                  <p:childTnLst>
+                                    <p:set>
+                                      <p:cBhvr>
+                                        <p:cTn id="30" dur="1" fill="hold">
+                                          <p:stCondLst>
+                                            <p:cond delay="0"/>
+                                          </p:stCondLst>
+                                        </p:cTn>
+                                        <p:tgtEl>
+                                          <p:spTgt spid="3">
+                                            <p:txEl>
+                                              <p:pRg st="11" end="11"/>
                                             </p:txEl>
                                           </p:spTgt>
                                         </p:tgtEl>
@@ -27504,14 +28354,14 @@
                                 </p:cTn>
                               </p:par>
                               <p:par>
-                                <p:cTn id="27" presetID="1" presetClass="entr" presetSubtype="0" fill="hold" nodeType="withEffect">
+                                <p:cTn id="31" presetID="1" presetClass="entr" presetSubtype="0" fill="hold" nodeType="withEffect">
                                   <p:stCondLst>
                                     <p:cond delay="0"/>
                                   </p:stCondLst>
                                   <p:childTnLst>
                                     <p:set>
                                       <p:cBhvr>
-                                        <p:cTn id="28" dur="1" fill="hold">
+                                        <p:cTn id="32" dur="1" fill="hold">
                                           <p:stCondLst>
                                             <p:cond delay="0"/>
                                           </p:stCondLst>
@@ -27519,7 +28369,38 @@
                                         <p:tgtEl>
                                           <p:spTgt spid="3">
                                             <p:txEl>
-                                              <p:pRg st="9" end="9"/>
+                                              <p:pRg st="12" end="12"/>
+                                            </p:txEl>
+                                          </p:spTgt>
+                                        </p:tgtEl>
+                                        <p:attrNameLst>
+                                          <p:attrName>style.visibility</p:attrName>
+                                        </p:attrNameLst>
+                                      </p:cBhvr>
+                                      <p:to>
+                                        <p:strVal val="visible"/>
+                                      </p:to>
+                                    </p:set>
+                                  </p:childTnLst>
+                                </p:cTn>
+                              </p:par>
+                              <p:par>
+                                <p:cTn id="33" presetID="1" presetClass="entr" presetSubtype="0" fill="hold" nodeType="withEffect">
+                                  <p:stCondLst>
+                                    <p:cond delay="0"/>
+                                  </p:stCondLst>
+                                  <p:childTnLst>
+                                    <p:set>
+                                      <p:cBhvr>
+                                        <p:cTn id="34" dur="1" fill="hold">
+                                          <p:stCondLst>
+                                            <p:cond delay="0"/>
+                                          </p:stCondLst>
+                                        </p:cTn>
+                                        <p:tgtEl>
+                                          <p:spTgt spid="3">
+                                            <p:txEl>
+                                              <p:pRg st="13" end="13"/>
                                             </p:txEl>
                                           </p:spTgt>
                                         </p:tgtEl>
@@ -33662,7 +34543,13 @@
   <p:cSld>
     <p:spTree>
       <p:nvGrpSpPr>
-        <p:cNvPr id="1" name=""/>
+        <p:cNvPr id="1" name="">
+          <a:extLst>
+            <a:ext uri="{FF2B5EF4-FFF2-40B4-BE49-F238E27FC236}">
+              <a16:creationId xmlns:a16="http://schemas.microsoft.com/office/drawing/2014/main" id="{A49C904F-6B0E-2277-CFBE-978784BFE255}"/>
+            </a:ext>
+          </a:extLst>
+        </p:cNvPr>
         <p:cNvGrpSpPr/>
         <p:nvPr/>
       </p:nvGrpSpPr>
@@ -33679,7 +34566,7 @@
           <p:cNvPr id="2" name="Title 1">
             <a:extLst>
               <a:ext uri="{FF2B5EF4-FFF2-40B4-BE49-F238E27FC236}">
-                <a16:creationId xmlns:a16="http://schemas.microsoft.com/office/drawing/2014/main" id="{4702757D-9716-4C25-BA54-81C26D6EC04E}"/>
+                <a16:creationId xmlns:a16="http://schemas.microsoft.com/office/drawing/2014/main" id="{9427E589-5BDE-6699-F9F3-FF57CACBCDAC}"/>
               </a:ext>
             </a:extLst>
           </p:cNvPr>
@@ -33706,7 +34593,7 @@
               <a:rPr lang="en-US" sz="4000" dirty="0">
                 <a:latin typeface="+mn-lt"/>
               </a:rPr>
-              <a:t>Information Retrieval </a:t>
+              <a:t>Introduction to Web Searching</a:t>
             </a:r>
           </a:p>
         </p:txBody>
@@ -33716,7 +34603,7 @@
           <p:cNvPr id="3" name="Content Placeholder 2">
             <a:extLst>
               <a:ext uri="{FF2B5EF4-FFF2-40B4-BE49-F238E27FC236}">
-                <a16:creationId xmlns:a16="http://schemas.microsoft.com/office/drawing/2014/main" id="{D9C502E2-3889-41D4-9A2E-D8C04ADE5184}"/>
+                <a16:creationId xmlns:a16="http://schemas.microsoft.com/office/drawing/2014/main" id="{4BC69A5A-4E55-96BE-1039-71C8305C3B04}"/>
               </a:ext>
             </a:extLst>
           </p:cNvPr>
@@ -33744,73 +34631,163 @@
             </a:pPr>
             <a:r>
               <a:rPr lang="en-US" dirty="0"/>
-              <a:t>Web search is a subset of the general </a:t>
-            </a:r>
-            <a:r>
-              <a:rPr lang="en-US" b="1" dirty="0">
-                <a:hlinkClick r:id="rId2"/>
+              <a:t>Many pitfalls in web search</a:t>
+            </a:r>
+          </a:p>
+          <a:p>
+            <a:r>
+              <a:rPr lang="en-US" dirty="0"/>
+              <a:t>Limited length query may not contain complete semantics or context</a:t>
+            </a:r>
+          </a:p>
+          <a:p>
+            <a:r>
+              <a:rPr lang="en-US" dirty="0"/>
+              <a:t>Natural language used for query is often ambiguous </a:t>
+            </a:r>
+          </a:p>
+          <a:p>
+            <a:pPr lvl="1"/>
+            <a:r>
+              <a:rPr lang="en-US" dirty="0"/>
+              <a:t>Example: Query for ‘</a:t>
+            </a:r>
+            <a:r>
+              <a:rPr lang="en-US" i="1" dirty="0"/>
+              <a:t>Jaguar numbers</a:t>
+            </a:r>
+            <a:r>
+              <a:rPr lang="en-US" dirty="0"/>
+              <a:t>’ could refer to an endangered large cat, an automobile, a sports team, or maybe something else??</a:t>
+            </a:r>
+          </a:p>
+          <a:p>
+            <a:r>
+              <a:rPr lang="en-US" dirty="0"/>
+              <a:t>Keywords are not unique to a topic</a:t>
+            </a:r>
+          </a:p>
+          <a:p>
+            <a:pPr lvl="1"/>
+            <a:r>
+              <a:rPr lang="en-US" dirty="0"/>
+              <a:t>Example: ‘</a:t>
+            </a:r>
+            <a:r>
+              <a:rPr lang="en-US" i="1" dirty="0"/>
+              <a:t>Ban</a:t>
+            </a:r>
+            <a:r>
+              <a:rPr lang="en-US" dirty="0"/>
+              <a:t>k’ can refer to a </a:t>
+            </a:r>
+            <a:r>
+              <a:rPr lang="en-US" i="1" dirty="0"/>
+              <a:t>financial institution</a:t>
+            </a:r>
+            <a:r>
+              <a:rPr lang="en-US" dirty="0"/>
+              <a:t>, the </a:t>
+            </a:r>
+            <a:r>
+              <a:rPr lang="en-US" i="1" dirty="0"/>
+              <a:t>edge of river</a:t>
+            </a:r>
+            <a:r>
+              <a:rPr lang="en-US" dirty="0"/>
+              <a:t>, or the </a:t>
+            </a:r>
+            <a:r>
+              <a:rPr lang="en-US" i="1" dirty="0"/>
+              <a:t>an aircraft maneuver, …  </a:t>
+            </a:r>
+          </a:p>
+          <a:p>
+            <a:r>
+              <a:rPr lang="en-US" dirty="0"/>
+              <a:t>Keywords have synonyms</a:t>
+            </a:r>
+          </a:p>
+          <a:p>
+            <a:pPr lvl="1"/>
+            <a:r>
+              <a:rPr lang="en-US" dirty="0"/>
+              <a:t>Example of two queries with different key words but identical </a:t>
+            </a:r>
+            <a:r>
+              <a:rPr lang="en-US" dirty="0" err="1"/>
+              <a:t>symantics</a:t>
+            </a:r>
+            <a:r>
+              <a:rPr lang="en-US" dirty="0"/>
+              <a:t> </a:t>
+            </a:r>
+          </a:p>
+          <a:p>
+            <a:pPr marL="457200" lvl="1" indent="0" algn="ctr">
+              <a:buNone/>
+            </a:pPr>
+            <a:r>
+              <a:rPr lang="en-US" dirty="0"/>
+              <a:t>“</a:t>
+            </a:r>
+            <a:r>
+              <a:rPr lang="en-US" i="1" dirty="0"/>
+              <a:t>What has been the loss of </a:t>
+            </a:r>
+            <a:r>
+              <a:rPr lang="en-US" b="1" i="1" dirty="0">
+                <a:solidFill>
+                  <a:srgbClr val="C00000"/>
+                </a:solidFill>
               </a:rPr>
-              <a:t>information </a:t>
-            </a:r>
-            <a:r>
-              <a:rPr lang="en-US" b="1" dirty="0" err="1">
-                <a:hlinkClick r:id="rId2"/>
+              <a:t>farm land </a:t>
+            </a:r>
+            <a:r>
+              <a:rPr lang="en-US" i="1" dirty="0"/>
+              <a:t>in the US in 2024</a:t>
+            </a:r>
+            <a:r>
+              <a:rPr lang="en-US" dirty="0"/>
+              <a:t>”    </a:t>
+            </a:r>
+          </a:p>
+          <a:p>
+            <a:pPr marL="457200" lvl="1" indent="0" algn="ctr">
+              <a:buNone/>
+            </a:pPr>
+            <a:r>
+              <a:rPr lang="en-US" dirty="0"/>
+              <a:t>“</a:t>
+            </a:r>
+            <a:r>
+              <a:rPr lang="en-US" i="1" dirty="0"/>
+              <a:t>How many </a:t>
+            </a:r>
+            <a:r>
+              <a:rPr lang="en-US" b="1" i="1" dirty="0">
+                <a:solidFill>
+                  <a:srgbClr val="C00000"/>
+                </a:solidFill>
               </a:rPr>
-              <a:t>retrevial</a:t>
-            </a:r>
-            <a:r>
-              <a:rPr lang="en-US" b="1" dirty="0">
-                <a:hlinkClick r:id="rId2"/>
-              </a:rPr>
-              <a:t> problem </a:t>
-            </a:r>
-            <a:endParaRPr lang="en-US" b="1" dirty="0"/>
-          </a:p>
-          <a:p>
+              <a:t>cultivated acers </a:t>
+            </a:r>
+            <a:r>
+              <a:rPr lang="en-US" i="1" dirty="0"/>
+              <a:t>were lost in the US </a:t>
+            </a:r>
+            <a:r>
+              <a:rPr lang="en-US" i="1" dirty="0" err="1"/>
+              <a:t>durring</a:t>
+            </a:r>
+            <a:r>
+              <a:rPr lang="en-US" i="1" dirty="0"/>
+              <a:t> 2024</a:t>
+            </a:r>
             <a:r>
               <a:rPr lang="en-US" dirty="0"/>
-              <a:t>Search of documents, medical, legal, technical, etc. </a:t>
-            </a:r>
-          </a:p>
-          <a:p>
-            <a:r>
-              <a:rPr lang="en-US" dirty="0"/>
-              <a:t>Question and response systems</a:t>
-            </a:r>
-          </a:p>
-          <a:p>
-            <a:r>
-              <a:rPr lang="en-US" dirty="0"/>
-              <a:t>Retrieval augmented generation (RAG)</a:t>
-            </a:r>
-          </a:p>
-          <a:p>
-            <a:r>
-              <a:rPr lang="en-US" dirty="0"/>
-              <a:t>Conversational assistance</a:t>
-            </a:r>
-          </a:p>
-          <a:p>
-            <a:r>
-              <a:rPr lang="en-US" dirty="0"/>
-              <a:t>De-duplicate document databases</a:t>
-            </a:r>
-          </a:p>
-          <a:p>
-            <a:r>
-              <a:rPr lang="en-US" dirty="0"/>
-              <a:t>Genomics research  </a:t>
-            </a:r>
-          </a:p>
-          <a:p>
-            <a:r>
-              <a:rPr lang="en-US" dirty="0"/>
-              <a:t>Etc. </a:t>
-            </a:r>
-          </a:p>
-          <a:p>
-            <a:pPr lvl="1"/>
-            <a:endParaRPr lang="en-US" dirty="0"/>
+              <a:t>”</a:t>
+            </a:r>
           </a:p>
           <a:p>
             <a:pPr lvl="1"/>
@@ -33821,7 +34798,7 @@
     </p:spTree>
     <p:extLst>
       <p:ext uri="{BB962C8B-B14F-4D97-AF65-F5344CB8AC3E}">
-        <p14:creationId xmlns:p14="http://schemas.microsoft.com/office/powerpoint/2010/main" val="617719479"/>
+        <p14:creationId xmlns:p14="http://schemas.microsoft.com/office/powerpoint/2010/main" val="643151138"/>
       </p:ext>
     </p:extLst>
   </p:cSld>
@@ -33928,33 +34905,15 @@
                                   </p:childTnLst>
                                 </p:cTn>
                               </p:par>
-                            </p:childTnLst>
-                          </p:cTn>
-                        </p:par>
-                      </p:childTnLst>
-                    </p:cTn>
-                  </p:par>
-                  <p:par>
-                    <p:cTn id="11" fill="hold">
-                      <p:stCondLst>
-                        <p:cond delay="indefinite"/>
-                      </p:stCondLst>
-                      <p:childTnLst>
-                        <p:par>
-                          <p:cTn id="12" fill="hold">
-                            <p:stCondLst>
-                              <p:cond delay="0"/>
-                            </p:stCondLst>
-                            <p:childTnLst>
                               <p:par>
-                                <p:cTn id="13" presetID="1" presetClass="entr" presetSubtype="0" fill="hold" nodeType="clickEffect">
+                                <p:cTn id="11" presetID="1" presetClass="entr" presetSubtype="0" fill="hold" nodeType="withEffect">
                                   <p:stCondLst>
                                     <p:cond delay="0"/>
                                   </p:stCondLst>
                                   <p:childTnLst>
                                     <p:set>
                                       <p:cBhvr>
-                                        <p:cTn id="14" dur="1" fill="hold">
+                                        <p:cTn id="12" dur="1" fill="hold">
                                           <p:stCondLst>
                                             <p:cond delay="0"/>
                                           </p:stCondLst>
@@ -33984,19 +34943,50 @@
                     </p:cTn>
                   </p:par>
                   <p:par>
-                    <p:cTn id="15" fill="hold">
+                    <p:cTn id="13" fill="hold">
                       <p:stCondLst>
                         <p:cond delay="indefinite"/>
                       </p:stCondLst>
                       <p:childTnLst>
                         <p:par>
-                          <p:cTn id="16" fill="hold">
+                          <p:cTn id="14" fill="hold">
                             <p:stCondLst>
                               <p:cond delay="0"/>
                             </p:stCondLst>
                             <p:childTnLst>
                               <p:par>
-                                <p:cTn id="17" presetID="1" presetClass="entr" presetSubtype="0" fill="hold" nodeType="clickEffect">
+                                <p:cTn id="15" presetID="1" presetClass="entr" presetSubtype="0" fill="hold" nodeType="clickEffect">
+                                  <p:stCondLst>
+                                    <p:cond delay="0"/>
+                                  </p:stCondLst>
+                                  <p:childTnLst>
+                                    <p:set>
+                                      <p:cBhvr>
+                                        <p:cTn id="16" dur="1" fill="hold">
+                                          <p:stCondLst>
+                                            <p:cond delay="0"/>
+                                          </p:stCondLst>
+                                        </p:cTn>
+                                        <p:tgtEl>
+                                          <p:spTgt spid="3">
+                                            <p:txEl>
+                                              <p:pRg st="4" end="4"/>
+                                            </p:txEl>
+                                          </p:spTgt>
+                                        </p:tgtEl>
+                                        <p:attrNameLst>
+                                          <p:attrName>style.visibility</p:attrName>
+                                        </p:attrNameLst>
+                                      </p:cBhvr>
+                                      <p:to>
+                                        <p:strVal val="visible"/>
+                                      </p:to>
+                                    </p:set>
+                                  </p:childTnLst>
+                                </p:cTn>
+                              </p:par>
+                              <p:par>
+                                <p:cTn id="17" presetID="1" presetClass="entr" presetSubtype="0" fill="hold" nodeType="withEffect">
                                   <p:stCondLst>
                                     <p:cond delay="0"/>
                                   </p:stCondLst>
@@ -34011,7 +35001,7 @@
                                         <p:tgtEl>
                                           <p:spTgt spid="3">
                                             <p:txEl>
-                                              <p:pRg st="4" end="4"/>
+                                              <p:pRg st="5" end="5"/>
                                             </p:txEl>
                                           </p:spTgt>
                                         </p:tgtEl>
@@ -34060,55 +35050,6 @@
                                         <p:tgtEl>
                                           <p:spTgt spid="3">
                                             <p:txEl>
-                                              <p:pRg st="5" end="5"/>
-                                            </p:txEl>
-                                          </p:spTgt>
-                                        </p:tgtEl>
-                                        <p:attrNameLst>
-                                          <p:attrName>style.visibility</p:attrName>
-                                        </p:attrNameLst>
-                                      </p:cBhvr>
-                                      <p:to>
-                                        <p:strVal val="visible"/>
-                                      </p:to>
-                                    </p:set>
-                                  </p:childTnLst>
-                                </p:cTn>
-                              </p:par>
-                            </p:childTnLst>
-                          </p:cTn>
-                        </p:par>
-                      </p:childTnLst>
-                    </p:cTn>
-                  </p:par>
-                  <p:par>
-                    <p:cTn id="23" fill="hold">
-                      <p:stCondLst>
-                        <p:cond delay="indefinite"/>
-                      </p:stCondLst>
-                      <p:childTnLst>
-                        <p:par>
-                          <p:cTn id="24" fill="hold">
-                            <p:stCondLst>
-                              <p:cond delay="0"/>
-                            </p:stCondLst>
-                            <p:childTnLst>
-                              <p:par>
-                                <p:cTn id="25" presetID="1" presetClass="entr" presetSubtype="0" fill="hold" nodeType="clickEffect">
-                                  <p:stCondLst>
-                                    <p:cond delay="0"/>
-                                  </p:stCondLst>
-                                  <p:childTnLst>
-                                    <p:set>
-                                      <p:cBhvr>
-                                        <p:cTn id="26" dur="1" fill="hold">
-                                          <p:stCondLst>
-                                            <p:cond delay="0"/>
-                                          </p:stCondLst>
-                                        </p:cTn>
-                                        <p:tgtEl>
-                                          <p:spTgt spid="3">
-                                            <p:txEl>
                                               <p:pRg st="6" end="6"/>
                                             </p:txEl>
                                           </p:spTgt>
@@ -34124,33 +35065,15 @@
                                   </p:childTnLst>
                                 </p:cTn>
                               </p:par>
-                            </p:childTnLst>
-                          </p:cTn>
-                        </p:par>
-                      </p:childTnLst>
-                    </p:cTn>
-                  </p:par>
-                  <p:par>
-                    <p:cTn id="27" fill="hold">
-                      <p:stCondLst>
-                        <p:cond delay="indefinite"/>
-                      </p:stCondLst>
-                      <p:childTnLst>
-                        <p:par>
-                          <p:cTn id="28" fill="hold">
-                            <p:stCondLst>
-                              <p:cond delay="0"/>
-                            </p:stCondLst>
-                            <p:childTnLst>
                               <p:par>
-                                <p:cTn id="29" presetID="1" presetClass="entr" presetSubtype="0" fill="hold" nodeType="clickEffect">
+                                <p:cTn id="23" presetID="1" presetClass="entr" presetSubtype="0" fill="hold" nodeType="withEffect">
                                   <p:stCondLst>
                                     <p:cond delay="0"/>
                                   </p:stCondLst>
                                   <p:childTnLst>
                                     <p:set>
                                       <p:cBhvr>
-                                        <p:cTn id="30" dur="1" fill="hold">
+                                        <p:cTn id="24" dur="1" fill="hold">
                                           <p:stCondLst>
                                             <p:cond delay="0"/>
                                           </p:stCondLst>
@@ -34159,6 +35082,68 @@
                                           <p:spTgt spid="3">
                                             <p:txEl>
                                               <p:pRg st="7" end="7"/>
+                                            </p:txEl>
+                                          </p:spTgt>
+                                        </p:tgtEl>
+                                        <p:attrNameLst>
+                                          <p:attrName>style.visibility</p:attrName>
+                                        </p:attrNameLst>
+                                      </p:cBhvr>
+                                      <p:to>
+                                        <p:strVal val="visible"/>
+                                      </p:to>
+                                    </p:set>
+                                  </p:childTnLst>
+                                </p:cTn>
+                              </p:par>
+                              <p:par>
+                                <p:cTn id="25" presetID="1" presetClass="entr" presetSubtype="0" fill="hold" nodeType="withEffect">
+                                  <p:stCondLst>
+                                    <p:cond delay="0"/>
+                                  </p:stCondLst>
+                                  <p:childTnLst>
+                                    <p:set>
+                                      <p:cBhvr>
+                                        <p:cTn id="26" dur="1" fill="hold">
+                                          <p:stCondLst>
+                                            <p:cond delay="0"/>
+                                          </p:stCondLst>
+                                        </p:cTn>
+                                        <p:tgtEl>
+                                          <p:spTgt spid="3">
+                                            <p:txEl>
+                                              <p:pRg st="8" end="8"/>
+                                            </p:txEl>
+                                          </p:spTgt>
+                                        </p:tgtEl>
+                                        <p:attrNameLst>
+                                          <p:attrName>style.visibility</p:attrName>
+                                        </p:attrNameLst>
+                                      </p:cBhvr>
+                                      <p:to>
+                                        <p:strVal val="visible"/>
+                                      </p:to>
+                                    </p:set>
+                                  </p:childTnLst>
+                                </p:cTn>
+                              </p:par>
+                              <p:par>
+                                <p:cTn id="27" presetID="1" presetClass="entr" presetSubtype="0" fill="hold" nodeType="withEffect">
+                                  <p:stCondLst>
+                                    <p:cond delay="0"/>
+                                  </p:stCondLst>
+                                  <p:childTnLst>
+                                    <p:set>
+                                      <p:cBhvr>
+                                        <p:cTn id="28" dur="1" fill="hold">
+                                          <p:stCondLst>
+                                            <p:cond delay="0"/>
+                                          </p:stCondLst>
+                                        </p:cTn>
+                                        <p:tgtEl>
+                                          <p:spTgt spid="3">
+                                            <p:txEl>
+                                              <p:pRg st="9" end="9"/>
                                             </p:txEl>
                                           </p:spTgt>
                                         </p:tgtEl>
@@ -39190,7 +40175,7 @@
         </p:nvSpPr>
         <p:spPr>
           <a:xfrm>
-            <a:off x="6358666" y="5463007"/>
+            <a:off x="6337209" y="5566989"/>
             <a:ext cx="1994135" cy="930682"/>
           </a:xfrm>
           <a:prstGeom prst="roundRect">
@@ -39332,14 +40317,15 @@
           </p:cNvPr>
           <p:cNvCxnSpPr>
             <a:cxnSpLocks/>
+            <a:stCxn id="86" idx="3"/>
             <a:endCxn id="87" idx="1"/>
           </p:cNvCxnSpPr>
           <p:nvPr/>
         </p:nvCxnSpPr>
         <p:spPr>
-          <a:xfrm flipV="1">
-            <a:off x="6134102" y="5928348"/>
-            <a:ext cx="224564" cy="36929"/>
+          <a:xfrm>
+            <a:off x="6101282" y="6024721"/>
+            <a:ext cx="235927" cy="7609"/>
           </a:xfrm>
           <a:prstGeom prst="straightConnector1">
             <a:avLst/>
@@ -39380,7 +40366,7 @@
         </p:nvSpPr>
         <p:spPr>
           <a:xfrm>
-            <a:off x="8718879" y="5387523"/>
+            <a:off x="8718879" y="5437811"/>
             <a:ext cx="1468902" cy="1162682"/>
           </a:xfrm>
           <a:prstGeom prst="roundRect">
@@ -39437,14 +40423,15 @@
           </p:cNvPr>
           <p:cNvCxnSpPr>
             <a:cxnSpLocks/>
+            <a:stCxn id="87" idx="3"/>
             <a:endCxn id="93" idx="1"/>
           </p:cNvCxnSpPr>
           <p:nvPr/>
         </p:nvCxnSpPr>
         <p:spPr>
-          <a:xfrm>
-            <a:off x="8404929" y="5946812"/>
-            <a:ext cx="313950" cy="22052"/>
+          <a:xfrm flipV="1">
+            <a:off x="8331344" y="6019152"/>
+            <a:ext cx="387535" cy="13178"/>
           </a:xfrm>
           <a:prstGeom prst="straightConnector1">
             <a:avLst/>
@@ -39488,7 +40475,7 @@
         </p:nvCxnSpPr>
         <p:spPr>
           <a:xfrm flipH="1">
-            <a:off x="7355734" y="4953969"/>
+            <a:off x="7334277" y="5057951"/>
             <a:ext cx="1221631" cy="509038"/>
           </a:xfrm>
           <a:prstGeom prst="straightConnector1">
@@ -39579,7 +40566,7 @@
         </p:nvSpPr>
         <p:spPr>
           <a:xfrm>
-            <a:off x="10789786" y="5347007"/>
+            <a:off x="10713014" y="5419052"/>
             <a:ext cx="1312808" cy="1162682"/>
           </a:xfrm>
           <a:prstGeom prst="roundRect">
@@ -39632,6 +40619,1467 @@
   <p:clrMapOvr>
     <a:masterClrMapping/>
   </p:clrMapOvr>
+  <p:timing>
+    <p:tnLst>
+      <p:par>
+        <p:cTn id="1" dur="indefinite" restart="never" nodeType="tmRoot">
+          <p:childTnLst>
+            <p:seq concurrent="1" nextAc="seek">
+              <p:cTn id="2" dur="indefinite" nodeType="mainSeq">
+                <p:childTnLst>
+                  <p:par>
+                    <p:cTn id="3" fill="hold">
+                      <p:stCondLst>
+                        <p:cond delay="indefinite"/>
+                      </p:stCondLst>
+                      <p:childTnLst>
+                        <p:par>
+                          <p:cTn id="4" fill="hold">
+                            <p:stCondLst>
+                              <p:cond delay="0"/>
+                            </p:stCondLst>
+                            <p:childTnLst>
+                              <p:par>
+                                <p:cTn id="5" presetID="1" presetClass="entr" presetSubtype="0" fill="hold" grpId="0" nodeType="clickEffect">
+                                  <p:stCondLst>
+                                    <p:cond delay="0"/>
+                                  </p:stCondLst>
+                                  <p:childTnLst>
+                                    <p:set>
+                                      <p:cBhvr>
+                                        <p:cTn id="6" dur="1" fill="hold">
+                                          <p:stCondLst>
+                                            <p:cond delay="0"/>
+                                          </p:stCondLst>
+                                        </p:cTn>
+                                        <p:tgtEl>
+                                          <p:spTgt spid="4"/>
+                                        </p:tgtEl>
+                                        <p:attrNameLst>
+                                          <p:attrName>style.visibility</p:attrName>
+                                        </p:attrNameLst>
+                                      </p:cBhvr>
+                                      <p:to>
+                                        <p:strVal val="visible"/>
+                                      </p:to>
+                                    </p:set>
+                                  </p:childTnLst>
+                                </p:cTn>
+                              </p:par>
+                              <p:par>
+                                <p:cTn id="7" presetID="1" presetClass="entr" presetSubtype="0" fill="hold" grpId="0" nodeType="withEffect">
+                                  <p:stCondLst>
+                                    <p:cond delay="0"/>
+                                  </p:stCondLst>
+                                  <p:childTnLst>
+                                    <p:set>
+                                      <p:cBhvr>
+                                        <p:cTn id="8" dur="1" fill="hold">
+                                          <p:stCondLst>
+                                            <p:cond delay="0"/>
+                                          </p:stCondLst>
+                                        </p:cTn>
+                                        <p:tgtEl>
+                                          <p:spTgt spid="10"/>
+                                        </p:tgtEl>
+                                        <p:attrNameLst>
+                                          <p:attrName>style.visibility</p:attrName>
+                                        </p:attrNameLst>
+                                      </p:cBhvr>
+                                      <p:to>
+                                        <p:strVal val="visible"/>
+                                      </p:to>
+                                    </p:set>
+                                  </p:childTnLst>
+                                </p:cTn>
+                              </p:par>
+                              <p:par>
+                                <p:cTn id="9" presetID="1" presetClass="entr" presetSubtype="0" fill="hold" grpId="0" nodeType="withEffect">
+                                  <p:stCondLst>
+                                    <p:cond delay="0"/>
+                                  </p:stCondLst>
+                                  <p:childTnLst>
+                                    <p:set>
+                                      <p:cBhvr>
+                                        <p:cTn id="10" dur="1" fill="hold">
+                                          <p:stCondLst>
+                                            <p:cond delay="0"/>
+                                          </p:stCondLst>
+                                        </p:cTn>
+                                        <p:tgtEl>
+                                          <p:spTgt spid="11"/>
+                                        </p:tgtEl>
+                                        <p:attrNameLst>
+                                          <p:attrName>style.visibility</p:attrName>
+                                        </p:attrNameLst>
+                                      </p:cBhvr>
+                                      <p:to>
+                                        <p:strVal val="visible"/>
+                                      </p:to>
+                                    </p:set>
+                                  </p:childTnLst>
+                                </p:cTn>
+                              </p:par>
+                              <p:par>
+                                <p:cTn id="11" presetID="1" presetClass="entr" presetSubtype="0" fill="hold" grpId="0" nodeType="withEffect">
+                                  <p:stCondLst>
+                                    <p:cond delay="0"/>
+                                  </p:stCondLst>
+                                  <p:childTnLst>
+                                    <p:set>
+                                      <p:cBhvr>
+                                        <p:cTn id="12" dur="1" fill="hold">
+                                          <p:stCondLst>
+                                            <p:cond delay="0"/>
+                                          </p:stCondLst>
+                                        </p:cTn>
+                                        <p:tgtEl>
+                                          <p:spTgt spid="12"/>
+                                        </p:tgtEl>
+                                        <p:attrNameLst>
+                                          <p:attrName>style.visibility</p:attrName>
+                                        </p:attrNameLst>
+                                      </p:cBhvr>
+                                      <p:to>
+                                        <p:strVal val="visible"/>
+                                      </p:to>
+                                    </p:set>
+                                  </p:childTnLst>
+                                </p:cTn>
+                              </p:par>
+                            </p:childTnLst>
+                          </p:cTn>
+                        </p:par>
+                      </p:childTnLst>
+                    </p:cTn>
+                  </p:par>
+                  <p:par>
+                    <p:cTn id="13" fill="hold">
+                      <p:stCondLst>
+                        <p:cond delay="indefinite"/>
+                      </p:stCondLst>
+                      <p:childTnLst>
+                        <p:par>
+                          <p:cTn id="14" fill="hold">
+                            <p:stCondLst>
+                              <p:cond delay="0"/>
+                            </p:stCondLst>
+                            <p:childTnLst>
+                              <p:par>
+                                <p:cTn id="15" presetID="1" presetClass="entr" presetSubtype="0" fill="hold" nodeType="clickEffect">
+                                  <p:stCondLst>
+                                    <p:cond delay="0"/>
+                                  </p:stCondLst>
+                                  <p:childTnLst>
+                                    <p:set>
+                                      <p:cBhvr>
+                                        <p:cTn id="16" dur="1" fill="hold">
+                                          <p:stCondLst>
+                                            <p:cond delay="0"/>
+                                          </p:stCondLst>
+                                        </p:cTn>
+                                        <p:tgtEl>
+                                          <p:spTgt spid="27"/>
+                                        </p:tgtEl>
+                                        <p:attrNameLst>
+                                          <p:attrName>style.visibility</p:attrName>
+                                        </p:attrNameLst>
+                                      </p:cBhvr>
+                                      <p:to>
+                                        <p:strVal val="visible"/>
+                                      </p:to>
+                                    </p:set>
+                                  </p:childTnLst>
+                                </p:cTn>
+                              </p:par>
+                              <p:par>
+                                <p:cTn id="17" presetID="1" presetClass="entr" presetSubtype="0" fill="hold" grpId="0" nodeType="withEffect">
+                                  <p:stCondLst>
+                                    <p:cond delay="0"/>
+                                  </p:stCondLst>
+                                  <p:childTnLst>
+                                    <p:set>
+                                      <p:cBhvr>
+                                        <p:cTn id="18" dur="1" fill="hold">
+                                          <p:stCondLst>
+                                            <p:cond delay="0"/>
+                                          </p:stCondLst>
+                                        </p:cTn>
+                                        <p:tgtEl>
+                                          <p:spTgt spid="15"/>
+                                        </p:tgtEl>
+                                        <p:attrNameLst>
+                                          <p:attrName>style.visibility</p:attrName>
+                                        </p:attrNameLst>
+                                      </p:cBhvr>
+                                      <p:to>
+                                        <p:strVal val="visible"/>
+                                      </p:to>
+                                    </p:set>
+                                  </p:childTnLst>
+                                </p:cTn>
+                              </p:par>
+                              <p:par>
+                                <p:cTn id="19" presetID="1" presetClass="entr" presetSubtype="0" fill="hold" grpId="0" nodeType="withEffect">
+                                  <p:stCondLst>
+                                    <p:cond delay="0"/>
+                                  </p:stCondLst>
+                                  <p:childTnLst>
+                                    <p:set>
+                                      <p:cBhvr>
+                                        <p:cTn id="20" dur="1" fill="hold">
+                                          <p:stCondLst>
+                                            <p:cond delay="0"/>
+                                          </p:stCondLst>
+                                        </p:cTn>
+                                        <p:tgtEl>
+                                          <p:spTgt spid="16"/>
+                                        </p:tgtEl>
+                                        <p:attrNameLst>
+                                          <p:attrName>style.visibility</p:attrName>
+                                        </p:attrNameLst>
+                                      </p:cBhvr>
+                                      <p:to>
+                                        <p:strVal val="visible"/>
+                                      </p:to>
+                                    </p:set>
+                                  </p:childTnLst>
+                                </p:cTn>
+                              </p:par>
+                              <p:par>
+                                <p:cTn id="21" presetID="1" presetClass="entr" presetSubtype="0" fill="hold" grpId="0" nodeType="withEffect">
+                                  <p:stCondLst>
+                                    <p:cond delay="0"/>
+                                  </p:stCondLst>
+                                  <p:childTnLst>
+                                    <p:set>
+                                      <p:cBhvr>
+                                        <p:cTn id="22" dur="1" fill="hold">
+                                          <p:stCondLst>
+                                            <p:cond delay="0"/>
+                                          </p:stCondLst>
+                                        </p:cTn>
+                                        <p:tgtEl>
+                                          <p:spTgt spid="17"/>
+                                        </p:tgtEl>
+                                        <p:attrNameLst>
+                                          <p:attrName>style.visibility</p:attrName>
+                                        </p:attrNameLst>
+                                      </p:cBhvr>
+                                      <p:to>
+                                        <p:strVal val="visible"/>
+                                      </p:to>
+                                    </p:set>
+                                  </p:childTnLst>
+                                </p:cTn>
+                              </p:par>
+                              <p:par>
+                                <p:cTn id="23" presetID="1" presetClass="entr" presetSubtype="0" fill="hold" grpId="0" nodeType="withEffect">
+                                  <p:stCondLst>
+                                    <p:cond delay="0"/>
+                                  </p:stCondLst>
+                                  <p:childTnLst>
+                                    <p:set>
+                                      <p:cBhvr>
+                                        <p:cTn id="24" dur="1" fill="hold">
+                                          <p:stCondLst>
+                                            <p:cond delay="0"/>
+                                          </p:stCondLst>
+                                        </p:cTn>
+                                        <p:tgtEl>
+                                          <p:spTgt spid="18"/>
+                                        </p:tgtEl>
+                                        <p:attrNameLst>
+                                          <p:attrName>style.visibility</p:attrName>
+                                        </p:attrNameLst>
+                                      </p:cBhvr>
+                                      <p:to>
+                                        <p:strVal val="visible"/>
+                                      </p:to>
+                                    </p:set>
+                                  </p:childTnLst>
+                                </p:cTn>
+                              </p:par>
+                              <p:par>
+                                <p:cTn id="25" presetID="1" presetClass="entr" presetSubtype="0" fill="hold" grpId="0" nodeType="withEffect">
+                                  <p:stCondLst>
+                                    <p:cond delay="0"/>
+                                  </p:stCondLst>
+                                  <p:childTnLst>
+                                    <p:set>
+                                      <p:cBhvr>
+                                        <p:cTn id="26" dur="1" fill="hold">
+                                          <p:stCondLst>
+                                            <p:cond delay="0"/>
+                                          </p:stCondLst>
+                                        </p:cTn>
+                                        <p:tgtEl>
+                                          <p:spTgt spid="19"/>
+                                        </p:tgtEl>
+                                        <p:attrNameLst>
+                                          <p:attrName>style.visibility</p:attrName>
+                                        </p:attrNameLst>
+                                      </p:cBhvr>
+                                      <p:to>
+                                        <p:strVal val="visible"/>
+                                      </p:to>
+                                    </p:set>
+                                  </p:childTnLst>
+                                </p:cTn>
+                              </p:par>
+                              <p:par>
+                                <p:cTn id="27" presetID="1" presetClass="entr" presetSubtype="0" fill="hold" nodeType="withEffect">
+                                  <p:stCondLst>
+                                    <p:cond delay="0"/>
+                                  </p:stCondLst>
+                                  <p:childTnLst>
+                                    <p:set>
+                                      <p:cBhvr>
+                                        <p:cTn id="28" dur="1" fill="hold">
+                                          <p:stCondLst>
+                                            <p:cond delay="0"/>
+                                          </p:stCondLst>
+                                        </p:cTn>
+                                        <p:tgtEl>
+                                          <p:spTgt spid="21"/>
+                                        </p:tgtEl>
+                                        <p:attrNameLst>
+                                          <p:attrName>style.visibility</p:attrName>
+                                        </p:attrNameLst>
+                                      </p:cBhvr>
+                                      <p:to>
+                                        <p:strVal val="visible"/>
+                                      </p:to>
+                                    </p:set>
+                                  </p:childTnLst>
+                                </p:cTn>
+                              </p:par>
+                              <p:par>
+                                <p:cTn id="29" presetID="1" presetClass="entr" presetSubtype="0" fill="hold" nodeType="withEffect">
+                                  <p:stCondLst>
+                                    <p:cond delay="0"/>
+                                  </p:stCondLst>
+                                  <p:childTnLst>
+                                    <p:set>
+                                      <p:cBhvr>
+                                        <p:cTn id="30" dur="1" fill="hold">
+                                          <p:stCondLst>
+                                            <p:cond delay="0"/>
+                                          </p:stCondLst>
+                                        </p:cTn>
+                                        <p:tgtEl>
+                                          <p:spTgt spid="23"/>
+                                        </p:tgtEl>
+                                        <p:attrNameLst>
+                                          <p:attrName>style.visibility</p:attrName>
+                                        </p:attrNameLst>
+                                      </p:cBhvr>
+                                      <p:to>
+                                        <p:strVal val="visible"/>
+                                      </p:to>
+                                    </p:set>
+                                  </p:childTnLst>
+                                </p:cTn>
+                              </p:par>
+                              <p:par>
+                                <p:cTn id="31" presetID="1" presetClass="entr" presetSubtype="0" fill="hold" nodeType="withEffect">
+                                  <p:stCondLst>
+                                    <p:cond delay="0"/>
+                                  </p:stCondLst>
+                                  <p:childTnLst>
+                                    <p:set>
+                                      <p:cBhvr>
+                                        <p:cTn id="32" dur="1" fill="hold">
+                                          <p:stCondLst>
+                                            <p:cond delay="0"/>
+                                          </p:stCondLst>
+                                        </p:cTn>
+                                        <p:tgtEl>
+                                          <p:spTgt spid="24"/>
+                                        </p:tgtEl>
+                                        <p:attrNameLst>
+                                          <p:attrName>style.visibility</p:attrName>
+                                        </p:attrNameLst>
+                                      </p:cBhvr>
+                                      <p:to>
+                                        <p:strVal val="visible"/>
+                                      </p:to>
+                                    </p:set>
+                                  </p:childTnLst>
+                                </p:cTn>
+                              </p:par>
+                              <p:par>
+                                <p:cTn id="33" presetID="1" presetClass="entr" presetSubtype="0" fill="hold" nodeType="withEffect">
+                                  <p:stCondLst>
+                                    <p:cond delay="0"/>
+                                  </p:stCondLst>
+                                  <p:childTnLst>
+                                    <p:set>
+                                      <p:cBhvr>
+                                        <p:cTn id="34" dur="1" fill="hold">
+                                          <p:stCondLst>
+                                            <p:cond delay="0"/>
+                                          </p:stCondLst>
+                                        </p:cTn>
+                                        <p:tgtEl>
+                                          <p:spTgt spid="31"/>
+                                        </p:tgtEl>
+                                        <p:attrNameLst>
+                                          <p:attrName>style.visibility</p:attrName>
+                                        </p:attrNameLst>
+                                      </p:cBhvr>
+                                      <p:to>
+                                        <p:strVal val="visible"/>
+                                      </p:to>
+                                    </p:set>
+                                  </p:childTnLst>
+                                </p:cTn>
+                              </p:par>
+                              <p:par>
+                                <p:cTn id="35" presetID="1" presetClass="entr" presetSubtype="0" fill="hold" nodeType="withEffect">
+                                  <p:stCondLst>
+                                    <p:cond delay="0"/>
+                                  </p:stCondLst>
+                                  <p:childTnLst>
+                                    <p:set>
+                                      <p:cBhvr>
+                                        <p:cTn id="36" dur="1" fill="hold">
+                                          <p:stCondLst>
+                                            <p:cond delay="0"/>
+                                          </p:stCondLst>
+                                        </p:cTn>
+                                        <p:tgtEl>
+                                          <p:spTgt spid="35"/>
+                                        </p:tgtEl>
+                                        <p:attrNameLst>
+                                          <p:attrName>style.visibility</p:attrName>
+                                        </p:attrNameLst>
+                                      </p:cBhvr>
+                                      <p:to>
+                                        <p:strVal val="visible"/>
+                                      </p:to>
+                                    </p:set>
+                                  </p:childTnLst>
+                                </p:cTn>
+                              </p:par>
+                              <p:par>
+                                <p:cTn id="37" presetID="1" presetClass="entr" presetSubtype="0" fill="hold" nodeType="withEffect">
+                                  <p:stCondLst>
+                                    <p:cond delay="0"/>
+                                  </p:stCondLst>
+                                  <p:childTnLst>
+                                    <p:set>
+                                      <p:cBhvr>
+                                        <p:cTn id="38" dur="1" fill="hold">
+                                          <p:stCondLst>
+                                            <p:cond delay="0"/>
+                                          </p:stCondLst>
+                                        </p:cTn>
+                                        <p:tgtEl>
+                                          <p:spTgt spid="39"/>
+                                        </p:tgtEl>
+                                        <p:attrNameLst>
+                                          <p:attrName>style.visibility</p:attrName>
+                                        </p:attrNameLst>
+                                      </p:cBhvr>
+                                      <p:to>
+                                        <p:strVal val="visible"/>
+                                      </p:to>
+                                    </p:set>
+                                  </p:childTnLst>
+                                </p:cTn>
+                              </p:par>
+                              <p:par>
+                                <p:cTn id="39" presetID="1" presetClass="entr" presetSubtype="0" fill="hold" nodeType="withEffect">
+                                  <p:stCondLst>
+                                    <p:cond delay="0"/>
+                                  </p:stCondLst>
+                                  <p:childTnLst>
+                                    <p:set>
+                                      <p:cBhvr>
+                                        <p:cTn id="40" dur="1" fill="hold">
+                                          <p:stCondLst>
+                                            <p:cond delay="0"/>
+                                          </p:stCondLst>
+                                        </p:cTn>
+                                        <p:tgtEl>
+                                          <p:spTgt spid="41"/>
+                                        </p:tgtEl>
+                                        <p:attrNameLst>
+                                          <p:attrName>style.visibility</p:attrName>
+                                        </p:attrNameLst>
+                                      </p:cBhvr>
+                                      <p:to>
+                                        <p:strVal val="visible"/>
+                                      </p:to>
+                                    </p:set>
+                                  </p:childTnLst>
+                                </p:cTn>
+                              </p:par>
+                              <p:par>
+                                <p:cTn id="41" presetID="1" presetClass="entr" presetSubtype="0" fill="hold" nodeType="withEffect">
+                                  <p:stCondLst>
+                                    <p:cond delay="0"/>
+                                  </p:stCondLst>
+                                  <p:childTnLst>
+                                    <p:set>
+                                      <p:cBhvr>
+                                        <p:cTn id="42" dur="1" fill="hold">
+                                          <p:stCondLst>
+                                            <p:cond delay="0"/>
+                                          </p:stCondLst>
+                                        </p:cTn>
+                                        <p:tgtEl>
+                                          <p:spTgt spid="46"/>
+                                        </p:tgtEl>
+                                        <p:attrNameLst>
+                                          <p:attrName>style.visibility</p:attrName>
+                                        </p:attrNameLst>
+                                      </p:cBhvr>
+                                      <p:to>
+                                        <p:strVal val="visible"/>
+                                      </p:to>
+                                    </p:set>
+                                  </p:childTnLst>
+                                </p:cTn>
+                              </p:par>
+                              <p:par>
+                                <p:cTn id="43" presetID="1" presetClass="entr" presetSubtype="0" fill="hold" nodeType="withEffect">
+                                  <p:stCondLst>
+                                    <p:cond delay="0"/>
+                                  </p:stCondLst>
+                                  <p:childTnLst>
+                                    <p:set>
+                                      <p:cBhvr>
+                                        <p:cTn id="44" dur="1" fill="hold">
+                                          <p:stCondLst>
+                                            <p:cond delay="0"/>
+                                          </p:stCondLst>
+                                        </p:cTn>
+                                        <p:tgtEl>
+                                          <p:spTgt spid="51"/>
+                                        </p:tgtEl>
+                                        <p:attrNameLst>
+                                          <p:attrName>style.visibility</p:attrName>
+                                        </p:attrNameLst>
+                                      </p:cBhvr>
+                                      <p:to>
+                                        <p:strVal val="visible"/>
+                                      </p:to>
+                                    </p:set>
+                                  </p:childTnLst>
+                                </p:cTn>
+                              </p:par>
+                              <p:par>
+                                <p:cTn id="45" presetID="1" presetClass="entr" presetSubtype="0" fill="hold" nodeType="withEffect">
+                                  <p:stCondLst>
+                                    <p:cond delay="0"/>
+                                  </p:stCondLst>
+                                  <p:childTnLst>
+                                    <p:set>
+                                      <p:cBhvr>
+                                        <p:cTn id="46" dur="1" fill="hold">
+                                          <p:stCondLst>
+                                            <p:cond delay="0"/>
+                                          </p:stCondLst>
+                                        </p:cTn>
+                                        <p:tgtEl>
+                                          <p:spTgt spid="52"/>
+                                        </p:tgtEl>
+                                        <p:attrNameLst>
+                                          <p:attrName>style.visibility</p:attrName>
+                                        </p:attrNameLst>
+                                      </p:cBhvr>
+                                      <p:to>
+                                        <p:strVal val="visible"/>
+                                      </p:to>
+                                    </p:set>
+                                  </p:childTnLst>
+                                </p:cTn>
+                              </p:par>
+                              <p:par>
+                                <p:cTn id="47" presetID="1" presetClass="entr" presetSubtype="0" fill="hold" nodeType="withEffect">
+                                  <p:stCondLst>
+                                    <p:cond delay="0"/>
+                                  </p:stCondLst>
+                                  <p:childTnLst>
+                                    <p:set>
+                                      <p:cBhvr>
+                                        <p:cTn id="48" dur="1" fill="hold">
+                                          <p:stCondLst>
+                                            <p:cond delay="0"/>
+                                          </p:stCondLst>
+                                        </p:cTn>
+                                        <p:tgtEl>
+                                          <p:spTgt spid="54"/>
+                                        </p:tgtEl>
+                                        <p:attrNameLst>
+                                          <p:attrName>style.visibility</p:attrName>
+                                        </p:attrNameLst>
+                                      </p:cBhvr>
+                                      <p:to>
+                                        <p:strVal val="visible"/>
+                                      </p:to>
+                                    </p:set>
+                                  </p:childTnLst>
+                                </p:cTn>
+                              </p:par>
+                            </p:childTnLst>
+                          </p:cTn>
+                        </p:par>
+                      </p:childTnLst>
+                    </p:cTn>
+                  </p:par>
+                  <p:par>
+                    <p:cTn id="49" fill="hold">
+                      <p:stCondLst>
+                        <p:cond delay="indefinite"/>
+                      </p:stCondLst>
+                      <p:childTnLst>
+                        <p:par>
+                          <p:cTn id="50" fill="hold">
+                            <p:stCondLst>
+                              <p:cond delay="0"/>
+                            </p:stCondLst>
+                            <p:childTnLst>
+                              <p:par>
+                                <p:cTn id="51" presetID="1" presetClass="entr" presetSubtype="0" fill="hold" grpId="0" nodeType="clickEffect">
+                                  <p:stCondLst>
+                                    <p:cond delay="0"/>
+                                  </p:stCondLst>
+                                  <p:childTnLst>
+                                    <p:set>
+                                      <p:cBhvr>
+                                        <p:cTn id="52" dur="1" fill="hold">
+                                          <p:stCondLst>
+                                            <p:cond delay="0"/>
+                                          </p:stCondLst>
+                                        </p:cTn>
+                                        <p:tgtEl>
+                                          <p:spTgt spid="66"/>
+                                        </p:tgtEl>
+                                        <p:attrNameLst>
+                                          <p:attrName>style.visibility</p:attrName>
+                                        </p:attrNameLst>
+                                      </p:cBhvr>
+                                      <p:to>
+                                        <p:strVal val="visible"/>
+                                      </p:to>
+                                    </p:set>
+                                  </p:childTnLst>
+                                </p:cTn>
+                              </p:par>
+                              <p:par>
+                                <p:cTn id="53" presetID="1" presetClass="entr" presetSubtype="0" fill="hold" nodeType="withEffect">
+                                  <p:stCondLst>
+                                    <p:cond delay="0"/>
+                                  </p:stCondLst>
+                                  <p:childTnLst>
+                                    <p:set>
+                                      <p:cBhvr>
+                                        <p:cTn id="54" dur="1" fill="hold">
+                                          <p:stCondLst>
+                                            <p:cond delay="0"/>
+                                          </p:stCondLst>
+                                        </p:cTn>
+                                        <p:tgtEl>
+                                          <p:spTgt spid="69"/>
+                                        </p:tgtEl>
+                                        <p:attrNameLst>
+                                          <p:attrName>style.visibility</p:attrName>
+                                        </p:attrNameLst>
+                                      </p:cBhvr>
+                                      <p:to>
+                                        <p:strVal val="visible"/>
+                                      </p:to>
+                                    </p:set>
+                                  </p:childTnLst>
+                                </p:cTn>
+                              </p:par>
+                              <p:par>
+                                <p:cTn id="55" presetID="1" presetClass="entr" presetSubtype="0" fill="hold" nodeType="withEffect">
+                                  <p:stCondLst>
+                                    <p:cond delay="0"/>
+                                  </p:stCondLst>
+                                  <p:childTnLst>
+                                    <p:set>
+                                      <p:cBhvr>
+                                        <p:cTn id="56" dur="1" fill="hold">
+                                          <p:stCondLst>
+                                            <p:cond delay="0"/>
+                                          </p:stCondLst>
+                                        </p:cTn>
+                                        <p:tgtEl>
+                                          <p:spTgt spid="71"/>
+                                        </p:tgtEl>
+                                        <p:attrNameLst>
+                                          <p:attrName>style.visibility</p:attrName>
+                                        </p:attrNameLst>
+                                      </p:cBhvr>
+                                      <p:to>
+                                        <p:strVal val="visible"/>
+                                      </p:to>
+                                    </p:set>
+                                  </p:childTnLst>
+                                </p:cTn>
+                              </p:par>
+                              <p:par>
+                                <p:cTn id="57" presetID="1" presetClass="entr" presetSubtype="0" fill="hold" nodeType="withEffect">
+                                  <p:stCondLst>
+                                    <p:cond delay="0"/>
+                                  </p:stCondLst>
+                                  <p:childTnLst>
+                                    <p:set>
+                                      <p:cBhvr>
+                                        <p:cTn id="58" dur="1" fill="hold">
+                                          <p:stCondLst>
+                                            <p:cond delay="0"/>
+                                          </p:stCondLst>
+                                        </p:cTn>
+                                        <p:tgtEl>
+                                          <p:spTgt spid="72"/>
+                                        </p:tgtEl>
+                                        <p:attrNameLst>
+                                          <p:attrName>style.visibility</p:attrName>
+                                        </p:attrNameLst>
+                                      </p:cBhvr>
+                                      <p:to>
+                                        <p:strVal val="visible"/>
+                                      </p:to>
+                                    </p:set>
+                                  </p:childTnLst>
+                                </p:cTn>
+                              </p:par>
+                              <p:par>
+                                <p:cTn id="59" presetID="1" presetClass="entr" presetSubtype="0" fill="hold" nodeType="withEffect">
+                                  <p:stCondLst>
+                                    <p:cond delay="0"/>
+                                  </p:stCondLst>
+                                  <p:childTnLst>
+                                    <p:set>
+                                      <p:cBhvr>
+                                        <p:cTn id="60" dur="1" fill="hold">
+                                          <p:stCondLst>
+                                            <p:cond delay="0"/>
+                                          </p:stCondLst>
+                                        </p:cTn>
+                                        <p:tgtEl>
+                                          <p:spTgt spid="73"/>
+                                        </p:tgtEl>
+                                        <p:attrNameLst>
+                                          <p:attrName>style.visibility</p:attrName>
+                                        </p:attrNameLst>
+                                      </p:cBhvr>
+                                      <p:to>
+                                        <p:strVal val="visible"/>
+                                      </p:to>
+                                    </p:set>
+                                  </p:childTnLst>
+                                </p:cTn>
+                              </p:par>
+                            </p:childTnLst>
+                          </p:cTn>
+                        </p:par>
+                      </p:childTnLst>
+                    </p:cTn>
+                  </p:par>
+                  <p:par>
+                    <p:cTn id="61" fill="hold">
+                      <p:stCondLst>
+                        <p:cond delay="indefinite"/>
+                      </p:stCondLst>
+                      <p:childTnLst>
+                        <p:par>
+                          <p:cTn id="62" fill="hold">
+                            <p:stCondLst>
+                              <p:cond delay="0"/>
+                            </p:stCondLst>
+                            <p:childTnLst>
+                              <p:par>
+                                <p:cTn id="63" presetID="1" presetClass="entr" presetSubtype="0" fill="hold" grpId="0" nodeType="clickEffect">
+                                  <p:stCondLst>
+                                    <p:cond delay="0"/>
+                                  </p:stCondLst>
+                                  <p:childTnLst>
+                                    <p:set>
+                                      <p:cBhvr>
+                                        <p:cTn id="64" dur="1" fill="hold">
+                                          <p:stCondLst>
+                                            <p:cond delay="0"/>
+                                          </p:stCondLst>
+                                        </p:cTn>
+                                        <p:tgtEl>
+                                          <p:spTgt spid="56"/>
+                                        </p:tgtEl>
+                                        <p:attrNameLst>
+                                          <p:attrName>style.visibility</p:attrName>
+                                        </p:attrNameLst>
+                                      </p:cBhvr>
+                                      <p:to>
+                                        <p:strVal val="visible"/>
+                                      </p:to>
+                                    </p:set>
+                                  </p:childTnLst>
+                                </p:cTn>
+                              </p:par>
+                              <p:par>
+                                <p:cTn id="65" presetID="1" presetClass="entr" presetSubtype="0" fill="hold" grpId="0" nodeType="withEffect">
+                                  <p:stCondLst>
+                                    <p:cond delay="0"/>
+                                  </p:stCondLst>
+                                  <p:childTnLst>
+                                    <p:set>
+                                      <p:cBhvr>
+                                        <p:cTn id="66" dur="1" fill="hold">
+                                          <p:stCondLst>
+                                            <p:cond delay="0"/>
+                                          </p:stCondLst>
+                                        </p:cTn>
+                                        <p:tgtEl>
+                                          <p:spTgt spid="60"/>
+                                        </p:tgtEl>
+                                        <p:attrNameLst>
+                                          <p:attrName>style.visibility</p:attrName>
+                                        </p:attrNameLst>
+                                      </p:cBhvr>
+                                      <p:to>
+                                        <p:strVal val="visible"/>
+                                      </p:to>
+                                    </p:set>
+                                  </p:childTnLst>
+                                </p:cTn>
+                              </p:par>
+                              <p:par>
+                                <p:cTn id="67" presetID="1" presetClass="entr" presetSubtype="0" fill="hold" grpId="0" nodeType="withEffect">
+                                  <p:stCondLst>
+                                    <p:cond delay="0"/>
+                                  </p:stCondLst>
+                                  <p:childTnLst>
+                                    <p:set>
+                                      <p:cBhvr>
+                                        <p:cTn id="68" dur="1" fill="hold">
+                                          <p:stCondLst>
+                                            <p:cond delay="0"/>
+                                          </p:stCondLst>
+                                        </p:cTn>
+                                        <p:tgtEl>
+                                          <p:spTgt spid="61"/>
+                                        </p:tgtEl>
+                                        <p:attrNameLst>
+                                          <p:attrName>style.visibility</p:attrName>
+                                        </p:attrNameLst>
+                                      </p:cBhvr>
+                                      <p:to>
+                                        <p:strVal val="visible"/>
+                                      </p:to>
+                                    </p:set>
+                                  </p:childTnLst>
+                                </p:cTn>
+                              </p:par>
+                              <p:par>
+                                <p:cTn id="69" presetID="1" presetClass="entr" presetSubtype="0" fill="hold" grpId="0" nodeType="withEffect">
+                                  <p:stCondLst>
+                                    <p:cond delay="0"/>
+                                  </p:stCondLst>
+                                  <p:childTnLst>
+                                    <p:set>
+                                      <p:cBhvr>
+                                        <p:cTn id="70" dur="1" fill="hold">
+                                          <p:stCondLst>
+                                            <p:cond delay="0"/>
+                                          </p:stCondLst>
+                                        </p:cTn>
+                                        <p:tgtEl>
+                                          <p:spTgt spid="62"/>
+                                        </p:tgtEl>
+                                        <p:attrNameLst>
+                                          <p:attrName>style.visibility</p:attrName>
+                                        </p:attrNameLst>
+                                      </p:cBhvr>
+                                      <p:to>
+                                        <p:strVal val="visible"/>
+                                      </p:to>
+                                    </p:set>
+                                  </p:childTnLst>
+                                </p:cTn>
+                              </p:par>
+                              <p:par>
+                                <p:cTn id="71" presetID="1" presetClass="entr" presetSubtype="0" fill="hold" grpId="0" nodeType="withEffect">
+                                  <p:stCondLst>
+                                    <p:cond delay="0"/>
+                                  </p:stCondLst>
+                                  <p:childTnLst>
+                                    <p:set>
+                                      <p:cBhvr>
+                                        <p:cTn id="72" dur="1" fill="hold">
+                                          <p:stCondLst>
+                                            <p:cond delay="0"/>
+                                          </p:stCondLst>
+                                        </p:cTn>
+                                        <p:tgtEl>
+                                          <p:spTgt spid="63"/>
+                                        </p:tgtEl>
+                                        <p:attrNameLst>
+                                          <p:attrName>style.visibility</p:attrName>
+                                        </p:attrNameLst>
+                                      </p:cBhvr>
+                                      <p:to>
+                                        <p:strVal val="visible"/>
+                                      </p:to>
+                                    </p:set>
+                                  </p:childTnLst>
+                                </p:cTn>
+                              </p:par>
+                              <p:par>
+                                <p:cTn id="73" presetID="1" presetClass="entr" presetSubtype="0" fill="hold" grpId="0" nodeType="withEffect">
+                                  <p:stCondLst>
+                                    <p:cond delay="0"/>
+                                  </p:stCondLst>
+                                  <p:childTnLst>
+                                    <p:set>
+                                      <p:cBhvr>
+                                        <p:cTn id="74" dur="1" fill="hold">
+                                          <p:stCondLst>
+                                            <p:cond delay="0"/>
+                                          </p:stCondLst>
+                                        </p:cTn>
+                                        <p:tgtEl>
+                                          <p:spTgt spid="65"/>
+                                        </p:tgtEl>
+                                        <p:attrNameLst>
+                                          <p:attrName>style.visibility</p:attrName>
+                                        </p:attrNameLst>
+                                      </p:cBhvr>
+                                      <p:to>
+                                        <p:strVal val="visible"/>
+                                      </p:to>
+                                    </p:set>
+                                  </p:childTnLst>
+                                </p:cTn>
+                              </p:par>
+                              <p:par>
+                                <p:cTn id="75" presetID="1" presetClass="entr" presetSubtype="0" fill="hold" grpId="0" nodeType="withEffect">
+                                  <p:stCondLst>
+                                    <p:cond delay="0"/>
+                                  </p:stCondLst>
+                                  <p:childTnLst>
+                                    <p:set>
+                                      <p:cBhvr>
+                                        <p:cTn id="76" dur="1" fill="hold">
+                                          <p:stCondLst>
+                                            <p:cond delay="0"/>
+                                          </p:stCondLst>
+                                        </p:cTn>
+                                        <p:tgtEl>
+                                          <p:spTgt spid="67"/>
+                                        </p:tgtEl>
+                                        <p:attrNameLst>
+                                          <p:attrName>style.visibility</p:attrName>
+                                        </p:attrNameLst>
+                                      </p:cBhvr>
+                                      <p:to>
+                                        <p:strVal val="visible"/>
+                                      </p:to>
+                                    </p:set>
+                                  </p:childTnLst>
+                                </p:cTn>
+                              </p:par>
+                              <p:par>
+                                <p:cTn id="77" presetID="1" presetClass="entr" presetSubtype="0" fill="hold" grpId="0" nodeType="withEffect">
+                                  <p:stCondLst>
+                                    <p:cond delay="0"/>
+                                  </p:stCondLst>
+                                  <p:childTnLst>
+                                    <p:set>
+                                      <p:cBhvr>
+                                        <p:cTn id="78" dur="1" fill="hold">
+                                          <p:stCondLst>
+                                            <p:cond delay="0"/>
+                                          </p:stCondLst>
+                                        </p:cTn>
+                                        <p:tgtEl>
+                                          <p:spTgt spid="74"/>
+                                        </p:tgtEl>
+                                        <p:attrNameLst>
+                                          <p:attrName>style.visibility</p:attrName>
+                                        </p:attrNameLst>
+                                      </p:cBhvr>
+                                      <p:to>
+                                        <p:strVal val="visible"/>
+                                      </p:to>
+                                    </p:set>
+                                  </p:childTnLst>
+                                </p:cTn>
+                              </p:par>
+                            </p:childTnLst>
+                          </p:cTn>
+                        </p:par>
+                      </p:childTnLst>
+                    </p:cTn>
+                  </p:par>
+                  <p:par>
+                    <p:cTn id="79" fill="hold">
+                      <p:stCondLst>
+                        <p:cond delay="indefinite"/>
+                      </p:stCondLst>
+                      <p:childTnLst>
+                        <p:par>
+                          <p:cTn id="80" fill="hold">
+                            <p:stCondLst>
+                              <p:cond delay="0"/>
+                            </p:stCondLst>
+                            <p:childTnLst>
+                              <p:par>
+                                <p:cTn id="81" presetID="1" presetClass="entr" presetSubtype="0" fill="hold" grpId="0" nodeType="clickEffect">
+                                  <p:stCondLst>
+                                    <p:cond delay="0"/>
+                                  </p:stCondLst>
+                                  <p:childTnLst>
+                                    <p:set>
+                                      <p:cBhvr>
+                                        <p:cTn id="82" dur="1" fill="hold">
+                                          <p:stCondLst>
+                                            <p:cond delay="0"/>
+                                          </p:stCondLst>
+                                        </p:cTn>
+                                        <p:tgtEl>
+                                          <p:spTgt spid="84"/>
+                                        </p:tgtEl>
+                                        <p:attrNameLst>
+                                          <p:attrName>style.visibility</p:attrName>
+                                        </p:attrNameLst>
+                                      </p:cBhvr>
+                                      <p:to>
+                                        <p:strVal val="visible"/>
+                                      </p:to>
+                                    </p:set>
+                                  </p:childTnLst>
+                                </p:cTn>
+                              </p:par>
+                            </p:childTnLst>
+                          </p:cTn>
+                        </p:par>
+                      </p:childTnLst>
+                    </p:cTn>
+                  </p:par>
+                  <p:par>
+                    <p:cTn id="83" fill="hold">
+                      <p:stCondLst>
+                        <p:cond delay="indefinite"/>
+                      </p:stCondLst>
+                      <p:childTnLst>
+                        <p:par>
+                          <p:cTn id="84" fill="hold">
+                            <p:stCondLst>
+                              <p:cond delay="0"/>
+                            </p:stCondLst>
+                            <p:childTnLst>
+                              <p:par>
+                                <p:cTn id="85" presetID="1" presetClass="entr" presetSubtype="0" fill="hold" grpId="0" nodeType="clickEffect">
+                                  <p:stCondLst>
+                                    <p:cond delay="0"/>
+                                  </p:stCondLst>
+                                  <p:childTnLst>
+                                    <p:set>
+                                      <p:cBhvr>
+                                        <p:cTn id="86" dur="1" fill="hold">
+                                          <p:stCondLst>
+                                            <p:cond delay="0"/>
+                                          </p:stCondLst>
+                                        </p:cTn>
+                                        <p:tgtEl>
+                                          <p:spTgt spid="85"/>
+                                        </p:tgtEl>
+                                        <p:attrNameLst>
+                                          <p:attrName>style.visibility</p:attrName>
+                                        </p:attrNameLst>
+                                      </p:cBhvr>
+                                      <p:to>
+                                        <p:strVal val="visible"/>
+                                      </p:to>
+                                    </p:set>
+                                  </p:childTnLst>
+                                </p:cTn>
+                              </p:par>
+                              <p:par>
+                                <p:cTn id="87" presetID="1" presetClass="entr" presetSubtype="0" fill="hold" nodeType="withEffect">
+                                  <p:stCondLst>
+                                    <p:cond delay="0"/>
+                                  </p:stCondLst>
+                                  <p:childTnLst>
+                                    <p:set>
+                                      <p:cBhvr>
+                                        <p:cTn id="88" dur="1" fill="hold">
+                                          <p:stCondLst>
+                                            <p:cond delay="0"/>
+                                          </p:stCondLst>
+                                        </p:cTn>
+                                        <p:tgtEl>
+                                          <p:spTgt spid="88"/>
+                                        </p:tgtEl>
+                                        <p:attrNameLst>
+                                          <p:attrName>style.visibility</p:attrName>
+                                        </p:attrNameLst>
+                                      </p:cBhvr>
+                                      <p:to>
+                                        <p:strVal val="visible"/>
+                                      </p:to>
+                                    </p:set>
+                                  </p:childTnLst>
+                                </p:cTn>
+                              </p:par>
+                            </p:childTnLst>
+                          </p:cTn>
+                        </p:par>
+                      </p:childTnLst>
+                    </p:cTn>
+                  </p:par>
+                  <p:par>
+                    <p:cTn id="89" fill="hold">
+                      <p:stCondLst>
+                        <p:cond delay="indefinite"/>
+                      </p:stCondLst>
+                      <p:childTnLst>
+                        <p:par>
+                          <p:cTn id="90" fill="hold">
+                            <p:stCondLst>
+                              <p:cond delay="0"/>
+                            </p:stCondLst>
+                            <p:childTnLst>
+                              <p:par>
+                                <p:cTn id="91" presetID="1" presetClass="entr" presetSubtype="0" fill="hold" grpId="0" nodeType="clickEffect">
+                                  <p:stCondLst>
+                                    <p:cond delay="0"/>
+                                  </p:stCondLst>
+                                  <p:childTnLst>
+                                    <p:set>
+                                      <p:cBhvr>
+                                        <p:cTn id="92" dur="1" fill="hold">
+                                          <p:stCondLst>
+                                            <p:cond delay="0"/>
+                                          </p:stCondLst>
+                                        </p:cTn>
+                                        <p:tgtEl>
+                                          <p:spTgt spid="86"/>
+                                        </p:tgtEl>
+                                        <p:attrNameLst>
+                                          <p:attrName>style.visibility</p:attrName>
+                                        </p:attrNameLst>
+                                      </p:cBhvr>
+                                      <p:to>
+                                        <p:strVal val="visible"/>
+                                      </p:to>
+                                    </p:set>
+                                  </p:childTnLst>
+                                </p:cTn>
+                              </p:par>
+                              <p:par>
+                                <p:cTn id="93" presetID="1" presetClass="entr" presetSubtype="0" fill="hold" nodeType="withEffect">
+                                  <p:stCondLst>
+                                    <p:cond delay="0"/>
+                                  </p:stCondLst>
+                                  <p:childTnLst>
+                                    <p:set>
+                                      <p:cBhvr>
+                                        <p:cTn id="94" dur="1" fill="hold">
+                                          <p:stCondLst>
+                                            <p:cond delay="0"/>
+                                          </p:stCondLst>
+                                        </p:cTn>
+                                        <p:tgtEl>
+                                          <p:spTgt spid="90"/>
+                                        </p:tgtEl>
+                                        <p:attrNameLst>
+                                          <p:attrName>style.visibility</p:attrName>
+                                        </p:attrNameLst>
+                                      </p:cBhvr>
+                                      <p:to>
+                                        <p:strVal val="visible"/>
+                                      </p:to>
+                                    </p:set>
+                                  </p:childTnLst>
+                                </p:cTn>
+                              </p:par>
+                            </p:childTnLst>
+                          </p:cTn>
+                        </p:par>
+                      </p:childTnLst>
+                    </p:cTn>
+                  </p:par>
+                  <p:par>
+                    <p:cTn id="95" fill="hold">
+                      <p:stCondLst>
+                        <p:cond delay="indefinite"/>
+                      </p:stCondLst>
+                      <p:childTnLst>
+                        <p:par>
+                          <p:cTn id="96" fill="hold">
+                            <p:stCondLst>
+                              <p:cond delay="0"/>
+                            </p:stCondLst>
+                            <p:childTnLst>
+                              <p:par>
+                                <p:cTn id="97" presetID="1" presetClass="entr" presetSubtype="0" fill="hold" grpId="0" nodeType="clickEffect">
+                                  <p:stCondLst>
+                                    <p:cond delay="0"/>
+                                  </p:stCondLst>
+                                  <p:childTnLst>
+                                    <p:set>
+                                      <p:cBhvr>
+                                        <p:cTn id="98" dur="1" fill="hold">
+                                          <p:stCondLst>
+                                            <p:cond delay="0"/>
+                                          </p:stCondLst>
+                                        </p:cTn>
+                                        <p:tgtEl>
+                                          <p:spTgt spid="87"/>
+                                        </p:tgtEl>
+                                        <p:attrNameLst>
+                                          <p:attrName>style.visibility</p:attrName>
+                                        </p:attrNameLst>
+                                      </p:cBhvr>
+                                      <p:to>
+                                        <p:strVal val="visible"/>
+                                      </p:to>
+                                    </p:set>
+                                  </p:childTnLst>
+                                </p:cTn>
+                              </p:par>
+                              <p:par>
+                                <p:cTn id="99" presetID="1" presetClass="entr" presetSubtype="0" fill="hold" nodeType="withEffect">
+                                  <p:stCondLst>
+                                    <p:cond delay="0"/>
+                                  </p:stCondLst>
+                                  <p:childTnLst>
+                                    <p:set>
+                                      <p:cBhvr>
+                                        <p:cTn id="100" dur="1" fill="hold">
+                                          <p:stCondLst>
+                                            <p:cond delay="0"/>
+                                          </p:stCondLst>
+                                        </p:cTn>
+                                        <p:tgtEl>
+                                          <p:spTgt spid="91"/>
+                                        </p:tgtEl>
+                                        <p:attrNameLst>
+                                          <p:attrName>style.visibility</p:attrName>
+                                        </p:attrNameLst>
+                                      </p:cBhvr>
+                                      <p:to>
+                                        <p:strVal val="visible"/>
+                                      </p:to>
+                                    </p:set>
+                                  </p:childTnLst>
+                                </p:cTn>
+                              </p:par>
+                              <p:par>
+                                <p:cTn id="101" presetID="1" presetClass="entr" presetSubtype="0" fill="hold" nodeType="withEffect">
+                                  <p:stCondLst>
+                                    <p:cond delay="0"/>
+                                  </p:stCondLst>
+                                  <p:childTnLst>
+                                    <p:set>
+                                      <p:cBhvr>
+                                        <p:cTn id="102" dur="1" fill="hold">
+                                          <p:stCondLst>
+                                            <p:cond delay="0"/>
+                                          </p:stCondLst>
+                                        </p:cTn>
+                                        <p:tgtEl>
+                                          <p:spTgt spid="96"/>
+                                        </p:tgtEl>
+                                        <p:attrNameLst>
+                                          <p:attrName>style.visibility</p:attrName>
+                                        </p:attrNameLst>
+                                      </p:cBhvr>
+                                      <p:to>
+                                        <p:strVal val="visible"/>
+                                      </p:to>
+                                    </p:set>
+                                  </p:childTnLst>
+                                </p:cTn>
+                              </p:par>
+                            </p:childTnLst>
+                          </p:cTn>
+                        </p:par>
+                      </p:childTnLst>
+                    </p:cTn>
+                  </p:par>
+                  <p:par>
+                    <p:cTn id="103" fill="hold">
+                      <p:stCondLst>
+                        <p:cond delay="indefinite"/>
+                      </p:stCondLst>
+                      <p:childTnLst>
+                        <p:par>
+                          <p:cTn id="104" fill="hold">
+                            <p:stCondLst>
+                              <p:cond delay="0"/>
+                            </p:stCondLst>
+                            <p:childTnLst>
+                              <p:par>
+                                <p:cTn id="105" presetID="1" presetClass="entr" presetSubtype="0" fill="hold" grpId="0" nodeType="clickEffect">
+                                  <p:stCondLst>
+                                    <p:cond delay="0"/>
+                                  </p:stCondLst>
+                                  <p:childTnLst>
+                                    <p:set>
+                                      <p:cBhvr>
+                                        <p:cTn id="106" dur="1" fill="hold">
+                                          <p:stCondLst>
+                                            <p:cond delay="0"/>
+                                          </p:stCondLst>
+                                        </p:cTn>
+                                        <p:tgtEl>
+                                          <p:spTgt spid="93"/>
+                                        </p:tgtEl>
+                                        <p:attrNameLst>
+                                          <p:attrName>style.visibility</p:attrName>
+                                        </p:attrNameLst>
+                                      </p:cBhvr>
+                                      <p:to>
+                                        <p:strVal val="visible"/>
+                                      </p:to>
+                                    </p:set>
+                                  </p:childTnLst>
+                                </p:cTn>
+                              </p:par>
+                              <p:par>
+                                <p:cTn id="107" presetID="1" presetClass="entr" presetSubtype="0" fill="hold" nodeType="withEffect">
+                                  <p:stCondLst>
+                                    <p:cond delay="0"/>
+                                  </p:stCondLst>
+                                  <p:childTnLst>
+                                    <p:set>
+                                      <p:cBhvr>
+                                        <p:cTn id="108" dur="1" fill="hold">
+                                          <p:stCondLst>
+                                            <p:cond delay="0"/>
+                                          </p:stCondLst>
+                                        </p:cTn>
+                                        <p:tgtEl>
+                                          <p:spTgt spid="94"/>
+                                        </p:tgtEl>
+                                        <p:attrNameLst>
+                                          <p:attrName>style.visibility</p:attrName>
+                                        </p:attrNameLst>
+                                      </p:cBhvr>
+                                      <p:to>
+                                        <p:strVal val="visible"/>
+                                      </p:to>
+                                    </p:set>
+                                  </p:childTnLst>
+                                </p:cTn>
+                              </p:par>
+                              <p:par>
+                                <p:cTn id="109" presetID="1" presetClass="entr" presetSubtype="0" fill="hold" grpId="0" nodeType="withEffect">
+                                  <p:stCondLst>
+                                    <p:cond delay="0"/>
+                                  </p:stCondLst>
+                                  <p:childTnLst>
+                                    <p:set>
+                                      <p:cBhvr>
+                                        <p:cTn id="110" dur="1" fill="hold">
+                                          <p:stCondLst>
+                                            <p:cond delay="0"/>
+                                          </p:stCondLst>
+                                        </p:cTn>
+                                        <p:tgtEl>
+                                          <p:spTgt spid="102"/>
+                                        </p:tgtEl>
+                                        <p:attrNameLst>
+                                          <p:attrName>style.visibility</p:attrName>
+                                        </p:attrNameLst>
+                                      </p:cBhvr>
+                                      <p:to>
+                                        <p:strVal val="visible"/>
+                                      </p:to>
+                                    </p:set>
+                                  </p:childTnLst>
+                                </p:cTn>
+                              </p:par>
+                              <p:par>
+                                <p:cTn id="111" presetID="1" presetClass="entr" presetSubtype="0" fill="hold" grpId="0" nodeType="withEffect">
+                                  <p:stCondLst>
+                                    <p:cond delay="0"/>
+                                  </p:stCondLst>
+                                  <p:childTnLst>
+                                    <p:set>
+                                      <p:cBhvr>
+                                        <p:cTn id="112" dur="1" fill="hold">
+                                          <p:stCondLst>
+                                            <p:cond delay="0"/>
+                                          </p:stCondLst>
+                                        </p:cTn>
+                                        <p:tgtEl>
+                                          <p:spTgt spid="103"/>
+                                        </p:tgtEl>
+                                        <p:attrNameLst>
+                                          <p:attrName>style.visibility</p:attrName>
+                                        </p:attrNameLst>
+                                      </p:cBhvr>
+                                      <p:to>
+                                        <p:strVal val="visible"/>
+                                      </p:to>
+                                    </p:set>
+                                  </p:childTnLst>
+                                </p:cTn>
+                              </p:par>
+                            </p:childTnLst>
+                          </p:cTn>
+                        </p:par>
+                      </p:childTnLst>
+                    </p:cTn>
+                  </p:par>
+                </p:childTnLst>
+              </p:cTn>
+              <p:prevCondLst>
+                <p:cond evt="onPrev" delay="0">
+                  <p:tgtEl>
+                    <p:sldTgt/>
+                  </p:tgtEl>
+                </p:cond>
+              </p:prevCondLst>
+              <p:nextCondLst>
+                <p:cond evt="onNext" delay="0">
+                  <p:tgtEl>
+                    <p:sldTgt/>
+                  </p:tgtEl>
+                </p:cond>
+              </p:nextCondLst>
+            </p:seq>
+          </p:childTnLst>
+        </p:cTn>
+      </p:par>
+    </p:tnLst>
+    <p:bldLst>
+      <p:bldP spid="4" grpId="0" animBg="1"/>
+      <p:bldP spid="10" grpId="0" animBg="1"/>
+      <p:bldP spid="11" grpId="0" animBg="1"/>
+      <p:bldP spid="12" grpId="0" animBg="1"/>
+      <p:bldP spid="15" grpId="0" animBg="1"/>
+      <p:bldP spid="16" grpId="0" animBg="1"/>
+      <p:bldP spid="17" grpId="0" animBg="1"/>
+      <p:bldP spid="18" grpId="0" animBg="1"/>
+      <p:bldP spid="19" grpId="0"/>
+      <p:bldP spid="56" grpId="0" animBg="1"/>
+      <p:bldP spid="60" grpId="0" animBg="1"/>
+      <p:bldP spid="61" grpId="0" animBg="1"/>
+      <p:bldP spid="62" grpId="0" animBg="1"/>
+      <p:bldP spid="63" grpId="0" animBg="1"/>
+      <p:bldP spid="65" grpId="0"/>
+      <p:bldP spid="66" grpId="0" animBg="1"/>
+      <p:bldP spid="67" grpId="0" animBg="1"/>
+      <p:bldP spid="74" grpId="0"/>
+      <p:bldP spid="84" grpId="0" animBg="1"/>
+      <p:bldP spid="85" grpId="0" animBg="1"/>
+      <p:bldP spid="86" grpId="0" animBg="1"/>
+      <p:bldP spid="87" grpId="0" animBg="1"/>
+      <p:bldP spid="93" grpId="0" animBg="1"/>
+      <p:bldP spid="102" grpId="0" animBg="1"/>
+      <p:bldP spid="103" grpId="0"/>
+    </p:bldLst>
+  </p:timing>
 </p:sld>
 </file>
 

</xml_diff>